<commit_message>
lender schema & create lender account route
</commit_message>
<xml_diff>
--- a/documentation/Amastata - Project Proposal.pptx
+++ b/documentation/Amastata - Project Proposal.pptx
@@ -284,7 +284,7 @@
           </c:tx>
           <c:spPr>
             <a:solidFill>
-              <a:schemeClr val="bg1"/>
+              <a:srgbClr val="00B0F0"/>
             </a:solidFill>
             <a:ln>
               <a:noFill/>
@@ -1186,7 +1186,7 @@
           <a:p>
             <a:fld id="{EABB664E-6B3E-4A6E-8882-B268D5FD83C7}" type="datetimeFigureOut">
               <a:rPr lang="en-US" smtClean="0"/>
-              <a:t>8/16/2023</a:t>
+              <a:t>9/18/2023</a:t>
             </a:fld>
             <a:endParaRPr lang="en-US"/>
           </a:p>
@@ -1680,7 +1680,7 @@
           <a:p>
             <a:fld id="{1D8BD707-D9CF-40AE-B4C6-C98DA3205C09}" type="datetimeFigureOut">
               <a:rPr lang="en-US"/>
-              <a:t>8/16/2023</a:t>
+              <a:t>9/18/2023</a:t>
             </a:fld>
             <a:endParaRPr lang="en-US"/>
           </a:p>
@@ -1855,7 +1855,7 @@
           <a:p>
             <a:fld id="{1D8BD707-D9CF-40AE-B4C6-C98DA3205C09}" type="datetimeFigureOut">
               <a:rPr lang="en-US"/>
-              <a:t>8/16/2023</a:t>
+              <a:t>9/18/2023</a:t>
             </a:fld>
             <a:endParaRPr lang="en-US"/>
           </a:p>
@@ -2081,7 +2081,7 @@
           <a:p>
             <a:fld id="{1D8BD707-D9CF-40AE-B4C6-C98DA3205C09}" type="datetimeFigureOut">
               <a:rPr lang="en-US"/>
-              <a:t>8/16/2023</a:t>
+              <a:t>9/18/2023</a:t>
             </a:fld>
             <a:endParaRPr lang="en-US"/>
           </a:p>
@@ -2309,7 +2309,7 @@
           <a:p>
             <a:fld id="{1D8BD707-D9CF-40AE-B4C6-C98DA3205C09}" type="datetimeFigureOut">
               <a:rPr lang="en-US"/>
-              <a:t>8/16/2023</a:t>
+              <a:t>9/18/2023</a:t>
             </a:fld>
             <a:endParaRPr lang="en-US"/>
           </a:p>
@@ -2428,7 +2428,7 @@
           <a:p>
             <a:fld id="{1D8BD707-D9CF-40AE-B4C6-C98DA3205C09}" type="datetimeFigureOut">
               <a:rPr lang="en-US"/>
-              <a:t>8/16/2023</a:t>
+              <a:t>9/18/2023</a:t>
             </a:fld>
             <a:endParaRPr lang="en-US"/>
           </a:p>
@@ -2673,7 +2673,7 @@
           <a:p>
             <a:fld id="{1D8BD707-D9CF-40AE-B4C6-C98DA3205C09}" type="datetimeFigureOut">
               <a:rPr lang="en-US"/>
-              <a:t>8/16/2023</a:t>
+              <a:t>9/18/2023</a:t>
             </a:fld>
             <a:endParaRPr lang="en-US"/>
           </a:p>
@@ -7424,7 +7424,7 @@
                         </a:rPr>
                         <a:t>Money</a:t>
                       </a:r>
-                      <a:endParaRPr sz="1200">
+                      <a:endParaRPr sz="1200" dirty="0">
                         <a:latin typeface="Bahnschrift Light"/>
                         <a:cs typeface="Bahnschrift Light"/>
                       </a:endParaRPr>
@@ -8645,7 +8645,7 @@
                         </a:rPr>
                         <a:t> loan.</a:t>
                       </a:r>
-                      <a:endParaRPr sz="1200">
+                      <a:endParaRPr sz="1200" dirty="0">
                         <a:latin typeface="Bahnschrift Light"/>
                         <a:cs typeface="Bahnschrift Light"/>
                       </a:endParaRPr>
@@ -8688,7 +8688,7 @@
                           <a:spcPct val="100000"/>
                         </a:lnSpc>
                       </a:pPr>
-                      <a:endParaRPr sz="1400">
+                      <a:endParaRPr sz="1400" dirty="0">
                         <a:latin typeface="Times New Roman"/>
                         <a:cs typeface="Times New Roman"/>
                       </a:endParaRPr>
@@ -8812,7 +8812,7 @@
                         </a:rPr>
                         <a:t>available</a:t>
                       </a:r>
-                      <a:endParaRPr sz="1200">
+                      <a:endParaRPr sz="1200" dirty="0">
                         <a:latin typeface="Bahnschrift Light"/>
                         <a:cs typeface="Bahnschrift Light"/>
                       </a:endParaRPr>
@@ -9422,7 +9422,7 @@
                         </a:rPr>
                         <a:t>client/Debtor.</a:t>
                       </a:r>
-                      <a:endParaRPr sz="1200">
+                      <a:endParaRPr sz="1200" dirty="0">
                         <a:latin typeface="Bahnschrift Light"/>
                         <a:cs typeface="Bahnschrift Light"/>
                       </a:endParaRPr>
@@ -9543,7 +9543,7 @@
                         </a:rPr>
                         <a:t>Money</a:t>
                       </a:r>
-                      <a:endParaRPr sz="1200">
+                      <a:endParaRPr sz="1200" dirty="0">
                         <a:latin typeface="Bahnschrift Light"/>
                         <a:cs typeface="Bahnschrift Light"/>
                       </a:endParaRPr>
@@ -9909,7 +9909,7 @@
                         </a:rPr>
                         <a:t>loans.</a:t>
                       </a:r>
-                      <a:endParaRPr sz="1200">
+                      <a:endParaRPr sz="1200" dirty="0">
                         <a:latin typeface="Bahnschrift Light"/>
                         <a:cs typeface="Bahnschrift Light"/>
                       </a:endParaRPr>
@@ -10390,7 +10390,7 @@
                 <a:spcPts val="45"/>
               </a:spcBef>
             </a:pPr>
-            <a:endParaRPr sz="1650">
+            <a:endParaRPr sz="1650" dirty="0">
               <a:latin typeface="Times New Roman"/>
               <a:cs typeface="Times New Roman"/>
             </a:endParaRPr>
@@ -10414,7 +10414,7 @@
               </a:rPr>
               <a:t>CLIENT/DEBTOR</a:t>
             </a:r>
-            <a:endParaRPr sz="1600">
+            <a:endParaRPr sz="1600" dirty="0">
               <a:latin typeface="Bahnschrift Light"/>
               <a:cs typeface="Bahnschrift Light"/>
             </a:endParaRPr>
@@ -10603,8 +10603,8 @@
         </p:nvSpPr>
         <p:spPr>
           <a:xfrm>
-            <a:off x="9099804" y="3429000"/>
-            <a:ext cx="1828800" cy="739140"/>
+            <a:off x="8763000" y="2743200"/>
+            <a:ext cx="2863596" cy="340478"/>
           </a:xfrm>
           <a:prstGeom prst="rect">
             <a:avLst/>
@@ -10630,7 +10630,7 @@
               </a:spcBef>
             </a:pPr>
             <a:r>
-              <a:rPr sz="1800" b="0" dirty="0">
+              <a:rPr lang="en-US" sz="1600" b="0" dirty="0">
                 <a:solidFill>
                   <a:srgbClr val="001F5F"/>
                 </a:solidFill>
@@ -10640,445 +10640,918 @@
               <a:t>M</a:t>
             </a:r>
             <a:r>
-              <a:rPr sz="1800" b="0" spc="-5" dirty="0">
-                <a:solidFill>
-                  <a:srgbClr val="001F5F"/>
-                </a:solidFill>
-                <a:latin typeface="Bahnschrift Light"/>
-                <a:cs typeface="Bahnschrift Light"/>
-              </a:rPr>
-              <a:t>I</a:t>
-            </a:r>
-            <a:r>
-              <a:rPr sz="1800" b="0" dirty="0">
-                <a:solidFill>
-                  <a:srgbClr val="001F5F"/>
-                </a:solidFill>
-                <a:latin typeface="Bahnschrift Light"/>
-                <a:cs typeface="Bahnschrift Light"/>
-              </a:rPr>
-              <a:t>CROF</a:t>
-            </a:r>
-            <a:r>
-              <a:rPr sz="1800" b="0" spc="-5" dirty="0">
-                <a:solidFill>
-                  <a:srgbClr val="001F5F"/>
-                </a:solidFill>
-                <a:latin typeface="Bahnschrift Light"/>
-                <a:cs typeface="Bahnschrift Light"/>
-              </a:rPr>
-              <a:t>INAN</a:t>
-            </a:r>
-            <a:r>
-              <a:rPr sz="1800" b="0" dirty="0">
-                <a:solidFill>
-                  <a:srgbClr val="001F5F"/>
-                </a:solidFill>
-                <a:latin typeface="Bahnschrift Light"/>
-                <a:cs typeface="Bahnschrift Light"/>
-              </a:rPr>
-              <a:t>CE  </a:t>
-            </a:r>
-            <a:r>
-              <a:rPr sz="1800" b="0" spc="-5" dirty="0">
-                <a:solidFill>
-                  <a:srgbClr val="001F5F"/>
-                </a:solidFill>
-                <a:latin typeface="Bahnschrift Light"/>
-                <a:cs typeface="Bahnschrift Light"/>
-              </a:rPr>
-              <a:t>INSTITUTION</a:t>
-            </a:r>
-            <a:endParaRPr sz="1800">
+              <a:rPr lang="en-US" sz="1600" b="0" spc="-5" dirty="0">
+                <a:solidFill>
+                  <a:srgbClr val="001F5F"/>
+                </a:solidFill>
+                <a:latin typeface="Bahnschrift Light"/>
+                <a:cs typeface="Bahnschrift Light"/>
+              </a:rPr>
+              <a:t>i</a:t>
+            </a:r>
+            <a:r>
+              <a:rPr lang="en-US" sz="1600" b="0" dirty="0">
+                <a:solidFill>
+                  <a:srgbClr val="001F5F"/>
+                </a:solidFill>
+                <a:latin typeface="Bahnschrift Light"/>
+                <a:cs typeface="Bahnschrift Light"/>
+              </a:rPr>
+              <a:t>crof</a:t>
+            </a:r>
+            <a:r>
+              <a:rPr lang="en-US" sz="1600" b="0" spc="-5" dirty="0">
+                <a:solidFill>
+                  <a:srgbClr val="001F5F"/>
+                </a:solidFill>
+                <a:latin typeface="Bahnschrift Light"/>
+                <a:cs typeface="Bahnschrift Light"/>
+              </a:rPr>
+              <a:t>inan</a:t>
+            </a:r>
+            <a:r>
+              <a:rPr lang="en-US" sz="1600" b="0" dirty="0">
+                <a:solidFill>
+                  <a:srgbClr val="001F5F"/>
+                </a:solidFill>
+                <a:latin typeface="Bahnschrift Light"/>
+                <a:cs typeface="Bahnschrift Light"/>
+              </a:rPr>
+              <a:t>ce  </a:t>
+            </a:r>
+            <a:r>
+              <a:rPr lang="en-US" sz="1600" b="0" spc="-5" dirty="0">
+                <a:solidFill>
+                  <a:srgbClr val="001F5F"/>
+                </a:solidFill>
+                <a:latin typeface="Bahnschrift Light"/>
+                <a:cs typeface="Bahnschrift Light"/>
+              </a:rPr>
+              <a:t>Institution 1</a:t>
+            </a:r>
+            <a:endParaRPr lang="en-US" sz="1600" dirty="0">
               <a:latin typeface="Bahnschrift Light"/>
               <a:cs typeface="Bahnschrift Light"/>
             </a:endParaRPr>
           </a:p>
         </p:txBody>
       </p:sp>
-      <p:grpSp>
-        <p:nvGrpSpPr>
-          <p:cNvPr id="8" name="object 8"/>
-          <p:cNvGrpSpPr/>
+      <p:sp>
+        <p:nvSpPr>
+          <p:cNvPr id="9" name="object 9"/>
+          <p:cNvSpPr/>
           <p:nvPr/>
-        </p:nvGrpSpPr>
-        <p:grpSpPr>
+        </p:nvSpPr>
+        <p:spPr>
           <a:xfrm>
-            <a:off x="2115314" y="2794763"/>
-            <a:ext cx="7937500" cy="2007235"/>
-            <a:chOff x="2115314" y="2794763"/>
-            <a:chExt cx="7937500" cy="2007235"/>
+            <a:off x="3067811" y="3799332"/>
+            <a:ext cx="1449705" cy="0"/>
           </a:xfrm>
-        </p:grpSpPr>
-        <p:sp>
-          <p:nvSpPr>
-            <p:cNvPr id="9" name="object 9"/>
-            <p:cNvSpPr/>
-            <p:nvPr/>
-          </p:nvSpPr>
-          <p:spPr>
-            <a:xfrm>
-              <a:off x="3067811" y="3799332"/>
-              <a:ext cx="1449705" cy="0"/>
-            </a:xfrm>
-            <a:custGeom>
-              <a:avLst/>
-              <a:gdLst/>
-              <a:ahLst/>
-              <a:cxnLst/>
-              <a:rect l="l" t="t" r="r" b="b"/>
-              <a:pathLst>
-                <a:path w="1449704">
-                  <a:moveTo>
-                    <a:pt x="0" y="0"/>
-                  </a:moveTo>
-                  <a:lnTo>
-                    <a:pt x="1449476" y="0"/>
-                  </a:lnTo>
-                </a:path>
-              </a:pathLst>
-            </a:custGeom>
-            <a:ln w="12700">
+          <a:custGeom>
+            <a:avLst/>
+            <a:gdLst/>
+            <a:ahLst/>
+            <a:cxnLst/>
+            <a:rect l="l" t="t" r="r" b="b"/>
+            <a:pathLst>
+              <a:path w="1449704">
+                <a:moveTo>
+                  <a:pt x="0" y="0"/>
+                </a:moveTo>
+                <a:lnTo>
+                  <a:pt x="1449476" y="0"/>
+                </a:lnTo>
+              </a:path>
+            </a:pathLst>
+          </a:custGeom>
+          <a:ln w="12700">
+            <a:solidFill>
+              <a:srgbClr val="001F5F"/>
+            </a:solidFill>
+          </a:ln>
+        </p:spPr>
+        <p:txBody>
+          <a:bodyPr wrap="square" lIns="0" tIns="0" rIns="0" bIns="0" rtlCol="0"/>
+          <a:lstStyle/>
+          <a:p>
+            <a:endParaRPr/>
+          </a:p>
+        </p:txBody>
+      </p:sp>
+      <p:sp>
+        <p:nvSpPr>
+          <p:cNvPr id="10" name="object 10"/>
+          <p:cNvSpPr/>
+          <p:nvPr/>
+        </p:nvSpPr>
+        <p:spPr>
+          <a:xfrm>
+            <a:off x="4504584" y="3761229"/>
+            <a:ext cx="76200" cy="76200"/>
+          </a:xfrm>
+          <a:custGeom>
+            <a:avLst/>
+            <a:gdLst/>
+            <a:ahLst/>
+            <a:cxnLst/>
+            <a:rect l="l" t="t" r="r" b="b"/>
+            <a:pathLst>
+              <a:path w="76200" h="76200">
+                <a:moveTo>
+                  <a:pt x="0" y="0"/>
+                </a:moveTo>
+                <a:lnTo>
+                  <a:pt x="0" y="76199"/>
+                </a:lnTo>
+                <a:lnTo>
+                  <a:pt x="76200" y="38099"/>
+                </a:lnTo>
+                <a:lnTo>
+                  <a:pt x="0" y="0"/>
+                </a:lnTo>
+                <a:close/>
+              </a:path>
+            </a:pathLst>
+          </a:custGeom>
+          <a:solidFill>
+            <a:srgbClr val="001F5F"/>
+          </a:solidFill>
+        </p:spPr>
+        <p:txBody>
+          <a:bodyPr wrap="square" lIns="0" tIns="0" rIns="0" bIns="0" rtlCol="0"/>
+          <a:lstStyle/>
+          <a:p>
+            <a:endParaRPr/>
+          </a:p>
+        </p:txBody>
+      </p:sp>
+      <p:sp>
+        <p:nvSpPr>
+          <p:cNvPr id="13" name="object 13"/>
+          <p:cNvSpPr/>
+          <p:nvPr/>
+        </p:nvSpPr>
+        <p:spPr>
+          <a:xfrm>
+            <a:off x="2153408" y="2801113"/>
+            <a:ext cx="3930650" cy="563880"/>
+          </a:xfrm>
+          <a:custGeom>
+            <a:avLst/>
+            <a:gdLst/>
+            <a:ahLst/>
+            <a:cxnLst/>
+            <a:rect l="l" t="t" r="r" b="b"/>
+            <a:pathLst>
+              <a:path w="3930650" h="563879">
+                <a:moveTo>
+                  <a:pt x="3930319" y="228600"/>
+                </a:moveTo>
+                <a:lnTo>
+                  <a:pt x="3930319" y="0"/>
+                </a:lnTo>
+                <a:lnTo>
+                  <a:pt x="0" y="0"/>
+                </a:lnTo>
+                <a:lnTo>
+                  <a:pt x="0" y="563816"/>
+                </a:lnTo>
+              </a:path>
+            </a:pathLst>
+          </a:custGeom>
+          <a:ln w="12700">
+            <a:solidFill>
+              <a:srgbClr val="001F5F"/>
+            </a:solidFill>
+          </a:ln>
+        </p:spPr>
+        <p:txBody>
+          <a:bodyPr wrap="square" lIns="0" tIns="0" rIns="0" bIns="0" rtlCol="0"/>
+          <a:lstStyle/>
+          <a:p>
+            <a:endParaRPr/>
+          </a:p>
+        </p:txBody>
+      </p:sp>
+      <p:sp>
+        <p:nvSpPr>
+          <p:cNvPr id="14" name="object 14"/>
+          <p:cNvSpPr/>
+          <p:nvPr/>
+        </p:nvSpPr>
+        <p:spPr>
+          <a:xfrm>
+            <a:off x="2115314" y="3352236"/>
+            <a:ext cx="76200" cy="76200"/>
+          </a:xfrm>
+          <a:custGeom>
+            <a:avLst/>
+            <a:gdLst/>
+            <a:ahLst/>
+            <a:cxnLst/>
+            <a:rect l="l" t="t" r="r" b="b"/>
+            <a:pathLst>
+              <a:path w="76200" h="76200">
+                <a:moveTo>
+                  <a:pt x="76200" y="0"/>
+                </a:moveTo>
+                <a:lnTo>
+                  <a:pt x="0" y="0"/>
+                </a:lnTo>
+                <a:lnTo>
+                  <a:pt x="38100" y="76200"/>
+                </a:lnTo>
+                <a:lnTo>
+                  <a:pt x="76200" y="0"/>
+                </a:lnTo>
+                <a:close/>
+              </a:path>
+            </a:pathLst>
+          </a:custGeom>
+          <a:solidFill>
+            <a:srgbClr val="001F5F"/>
+          </a:solidFill>
+        </p:spPr>
+        <p:txBody>
+          <a:bodyPr wrap="square" lIns="0" tIns="0" rIns="0" bIns="0" rtlCol="0"/>
+          <a:lstStyle/>
+          <a:p>
+            <a:endParaRPr/>
+          </a:p>
+        </p:txBody>
+      </p:sp>
+      <p:sp>
+        <p:nvSpPr>
+          <p:cNvPr id="17" name="object 7">
+            <a:extLst>
+              <a:ext uri="{FF2B5EF4-FFF2-40B4-BE49-F238E27FC236}">
+                <a16:creationId xmlns:a16="http://schemas.microsoft.com/office/drawing/2014/main" id="{AE1067BC-0861-B5BE-C7E5-7A7176AFEBBD}"/>
+              </a:ext>
+            </a:extLst>
+          </p:cNvPr>
+          <p:cNvSpPr txBox="1"/>
+          <p:nvPr/>
+        </p:nvSpPr>
+        <p:spPr>
+          <a:xfrm>
+            <a:off x="8763000" y="3370523"/>
+            <a:ext cx="2863596" cy="340478"/>
+          </a:xfrm>
+          <a:prstGeom prst="rect">
+            <a:avLst/>
+          </a:prstGeom>
+          <a:ln w="12700">
+            <a:solidFill>
+              <a:srgbClr val="001F5F"/>
+            </a:solidFill>
+          </a:ln>
+        </p:spPr>
+        <p:txBody>
+          <a:bodyPr vert="horz" wrap="square" lIns="0" tIns="93345" rIns="0" bIns="0" rtlCol="0">
+            <a:spAutoFit/>
+          </a:bodyPr>
+          <a:lstStyle/>
+          <a:p>
+            <a:pPr marL="276225" marR="98425" indent="-170815">
+              <a:lnSpc>
+                <a:spcPct val="100000"/>
+              </a:lnSpc>
+              <a:spcBef>
+                <a:spcPts val="735"/>
+              </a:spcBef>
+            </a:pPr>
+            <a:r>
+              <a:rPr lang="en-US" sz="1600" b="0" dirty="0">
+                <a:solidFill>
+                  <a:srgbClr val="001F5F"/>
+                </a:solidFill>
+                <a:latin typeface="Bahnschrift Light"/>
+                <a:cs typeface="Bahnschrift Light"/>
+              </a:rPr>
+              <a:t>M</a:t>
+            </a:r>
+            <a:r>
+              <a:rPr lang="en-US" sz="1600" b="0" spc="-5" dirty="0">
+                <a:solidFill>
+                  <a:srgbClr val="001F5F"/>
+                </a:solidFill>
+                <a:latin typeface="Bahnschrift Light"/>
+                <a:cs typeface="Bahnschrift Light"/>
+              </a:rPr>
+              <a:t>i</a:t>
+            </a:r>
+            <a:r>
+              <a:rPr lang="en-US" sz="1600" b="0" dirty="0">
+                <a:solidFill>
+                  <a:srgbClr val="001F5F"/>
+                </a:solidFill>
+                <a:latin typeface="Bahnschrift Light"/>
+                <a:cs typeface="Bahnschrift Light"/>
+              </a:rPr>
+              <a:t>crof</a:t>
+            </a:r>
+            <a:r>
+              <a:rPr lang="en-US" sz="1600" b="0" spc="-5" dirty="0">
+                <a:solidFill>
+                  <a:srgbClr val="001F5F"/>
+                </a:solidFill>
+                <a:latin typeface="Bahnschrift Light"/>
+                <a:cs typeface="Bahnschrift Light"/>
+              </a:rPr>
+              <a:t>inan</a:t>
+            </a:r>
+            <a:r>
+              <a:rPr lang="en-US" sz="1600" b="0" dirty="0">
+                <a:solidFill>
+                  <a:srgbClr val="001F5F"/>
+                </a:solidFill>
+                <a:latin typeface="Bahnschrift Light"/>
+                <a:cs typeface="Bahnschrift Light"/>
+              </a:rPr>
+              <a:t>ce  </a:t>
+            </a:r>
+            <a:r>
+              <a:rPr lang="en-US" sz="1600" b="0" spc="-5" dirty="0">
+                <a:solidFill>
+                  <a:srgbClr val="001F5F"/>
+                </a:solidFill>
+                <a:latin typeface="Bahnschrift Light"/>
+                <a:cs typeface="Bahnschrift Light"/>
+              </a:rPr>
+              <a:t>Institution ..</a:t>
+            </a:r>
+            <a:endParaRPr lang="en-US" sz="1600" dirty="0">
+              <a:latin typeface="Bahnschrift Light"/>
+              <a:cs typeface="Bahnschrift Light"/>
+            </a:endParaRPr>
+          </a:p>
+        </p:txBody>
+      </p:sp>
+      <p:sp>
+        <p:nvSpPr>
+          <p:cNvPr id="18" name="object 7">
+            <a:extLst>
+              <a:ext uri="{FF2B5EF4-FFF2-40B4-BE49-F238E27FC236}">
+                <a16:creationId xmlns:a16="http://schemas.microsoft.com/office/drawing/2014/main" id="{12C5A14D-32CF-6079-E6EB-92E54AE9DE05}"/>
+              </a:ext>
+            </a:extLst>
+          </p:cNvPr>
+          <p:cNvSpPr txBox="1"/>
+          <p:nvPr/>
+        </p:nvSpPr>
+        <p:spPr>
+          <a:xfrm>
+            <a:off x="8763000" y="3965143"/>
+            <a:ext cx="2863596" cy="340478"/>
+          </a:xfrm>
+          <a:prstGeom prst="rect">
+            <a:avLst/>
+          </a:prstGeom>
+          <a:ln w="12700">
+            <a:solidFill>
+              <a:srgbClr val="001F5F"/>
+            </a:solidFill>
+          </a:ln>
+        </p:spPr>
+        <p:txBody>
+          <a:bodyPr vert="horz" wrap="square" lIns="0" tIns="93345" rIns="0" bIns="0" rtlCol="0">
+            <a:spAutoFit/>
+          </a:bodyPr>
+          <a:lstStyle/>
+          <a:p>
+            <a:pPr marL="276225" marR="98425" indent="-170815">
+              <a:lnSpc>
+                <a:spcPct val="100000"/>
+              </a:lnSpc>
+              <a:spcBef>
+                <a:spcPts val="735"/>
+              </a:spcBef>
+            </a:pPr>
+            <a:r>
+              <a:rPr lang="en-US" sz="1600" b="0" dirty="0">
+                <a:solidFill>
+                  <a:srgbClr val="001F5F"/>
+                </a:solidFill>
+                <a:latin typeface="Bahnschrift Light"/>
+                <a:cs typeface="Bahnschrift Light"/>
+              </a:rPr>
+              <a:t>M</a:t>
+            </a:r>
+            <a:r>
+              <a:rPr lang="en-US" sz="1600" b="0" spc="-5" dirty="0">
+                <a:solidFill>
+                  <a:srgbClr val="001F5F"/>
+                </a:solidFill>
+                <a:latin typeface="Bahnschrift Light"/>
+                <a:cs typeface="Bahnschrift Light"/>
+              </a:rPr>
+              <a:t>i</a:t>
+            </a:r>
+            <a:r>
+              <a:rPr lang="en-US" sz="1600" b="0" dirty="0">
+                <a:solidFill>
+                  <a:srgbClr val="001F5F"/>
+                </a:solidFill>
+                <a:latin typeface="Bahnschrift Light"/>
+                <a:cs typeface="Bahnschrift Light"/>
+              </a:rPr>
+              <a:t>crof</a:t>
+            </a:r>
+            <a:r>
+              <a:rPr lang="en-US" sz="1600" b="0" spc="-5" dirty="0">
+                <a:solidFill>
+                  <a:srgbClr val="001F5F"/>
+                </a:solidFill>
+                <a:latin typeface="Bahnschrift Light"/>
+                <a:cs typeface="Bahnschrift Light"/>
+              </a:rPr>
+              <a:t>inan</a:t>
+            </a:r>
+            <a:r>
+              <a:rPr lang="en-US" sz="1600" b="0" dirty="0">
+                <a:solidFill>
+                  <a:srgbClr val="001F5F"/>
+                </a:solidFill>
+                <a:latin typeface="Bahnschrift Light"/>
+                <a:cs typeface="Bahnschrift Light"/>
+              </a:rPr>
+              <a:t>ce  </a:t>
+            </a:r>
+            <a:r>
+              <a:rPr lang="en-US" sz="1600" b="0" spc="-5" dirty="0">
+                <a:solidFill>
+                  <a:srgbClr val="001F5F"/>
+                </a:solidFill>
+                <a:latin typeface="Bahnschrift Light"/>
+                <a:cs typeface="Bahnschrift Light"/>
+              </a:rPr>
+              <a:t>Institution ..</a:t>
+            </a:r>
+            <a:endParaRPr lang="en-US" sz="1600" dirty="0">
+              <a:latin typeface="Bahnschrift Light"/>
+              <a:cs typeface="Bahnschrift Light"/>
+            </a:endParaRPr>
+          </a:p>
+        </p:txBody>
+      </p:sp>
+      <p:sp>
+        <p:nvSpPr>
+          <p:cNvPr id="19" name="object 7">
+            <a:extLst>
+              <a:ext uri="{FF2B5EF4-FFF2-40B4-BE49-F238E27FC236}">
+                <a16:creationId xmlns:a16="http://schemas.microsoft.com/office/drawing/2014/main" id="{700ACE08-889B-4E5E-E445-55CCF69C7DB2}"/>
+              </a:ext>
+            </a:extLst>
+          </p:cNvPr>
+          <p:cNvSpPr txBox="1"/>
+          <p:nvPr/>
+        </p:nvSpPr>
+        <p:spPr>
+          <a:xfrm>
+            <a:off x="8763000" y="4559763"/>
+            <a:ext cx="2863596" cy="340478"/>
+          </a:xfrm>
+          <a:prstGeom prst="rect">
+            <a:avLst/>
+          </a:prstGeom>
+          <a:ln w="12700">
+            <a:solidFill>
+              <a:srgbClr val="001F5F"/>
+            </a:solidFill>
+          </a:ln>
+        </p:spPr>
+        <p:txBody>
+          <a:bodyPr vert="horz" wrap="square" lIns="0" tIns="93345" rIns="0" bIns="0" rtlCol="0">
+            <a:spAutoFit/>
+          </a:bodyPr>
+          <a:lstStyle/>
+          <a:p>
+            <a:pPr marL="276225" marR="98425" indent="-170815">
+              <a:lnSpc>
+                <a:spcPct val="100000"/>
+              </a:lnSpc>
+              <a:spcBef>
+                <a:spcPts val="735"/>
+              </a:spcBef>
+            </a:pPr>
+            <a:r>
+              <a:rPr lang="en-US" sz="1600" b="0" dirty="0">
+                <a:solidFill>
+                  <a:srgbClr val="001F5F"/>
+                </a:solidFill>
+                <a:latin typeface="Bahnschrift Light"/>
+                <a:cs typeface="Bahnschrift Light"/>
+              </a:rPr>
+              <a:t>M</a:t>
+            </a:r>
+            <a:r>
+              <a:rPr lang="en-US" sz="1600" b="0" spc="-5" dirty="0">
+                <a:solidFill>
+                  <a:srgbClr val="001F5F"/>
+                </a:solidFill>
+                <a:latin typeface="Bahnschrift Light"/>
+                <a:cs typeface="Bahnschrift Light"/>
+              </a:rPr>
+              <a:t>i</a:t>
+            </a:r>
+            <a:r>
+              <a:rPr lang="en-US" sz="1600" b="0" dirty="0">
+                <a:solidFill>
+                  <a:srgbClr val="001F5F"/>
+                </a:solidFill>
+                <a:latin typeface="Bahnschrift Light"/>
+                <a:cs typeface="Bahnschrift Light"/>
+              </a:rPr>
+              <a:t>crof</a:t>
+            </a:r>
+            <a:r>
+              <a:rPr lang="en-US" sz="1600" b="0" spc="-5" dirty="0">
+                <a:solidFill>
+                  <a:srgbClr val="001F5F"/>
+                </a:solidFill>
+                <a:latin typeface="Bahnschrift Light"/>
+                <a:cs typeface="Bahnschrift Light"/>
+              </a:rPr>
+              <a:t>inan</a:t>
+            </a:r>
+            <a:r>
+              <a:rPr lang="en-US" sz="1600" b="0" dirty="0">
+                <a:solidFill>
+                  <a:srgbClr val="001F5F"/>
+                </a:solidFill>
+                <a:latin typeface="Bahnschrift Light"/>
+                <a:cs typeface="Bahnschrift Light"/>
+              </a:rPr>
+              <a:t>ce  </a:t>
+            </a:r>
+            <a:r>
+              <a:rPr lang="en-US" sz="1600" b="0" spc="-5" dirty="0">
+                <a:solidFill>
+                  <a:srgbClr val="001F5F"/>
+                </a:solidFill>
+                <a:latin typeface="Bahnschrift Light"/>
+                <a:cs typeface="Bahnschrift Light"/>
+              </a:rPr>
+              <a:t>Institution ..n</a:t>
+            </a:r>
+            <a:endParaRPr lang="en-US" sz="1600" dirty="0">
+              <a:latin typeface="Bahnschrift Light"/>
+              <a:cs typeface="Bahnschrift Light"/>
+            </a:endParaRPr>
+          </a:p>
+        </p:txBody>
+      </p:sp>
+      <p:cxnSp>
+        <p:nvCxnSpPr>
+          <p:cNvPr id="21" name="Connector: Elbow 20">
+            <a:extLst>
+              <a:ext uri="{FF2B5EF4-FFF2-40B4-BE49-F238E27FC236}">
+                <a16:creationId xmlns:a16="http://schemas.microsoft.com/office/drawing/2014/main" id="{AA8DA5DD-D0D2-E68C-B3DE-A171B7B25F83}"/>
+              </a:ext>
+            </a:extLst>
+          </p:cNvPr>
+          <p:cNvCxnSpPr>
+            <a:stCxn id="7" idx="1"/>
+            <a:endCxn id="19" idx="1"/>
+          </p:cNvCxnSpPr>
+          <p:nvPr/>
+        </p:nvCxnSpPr>
+        <p:spPr>
+          <a:xfrm rot="10800000" flipV="1">
+            <a:off x="8763000" y="2913438"/>
+            <a:ext cx="12700" cy="1816563"/>
+          </a:xfrm>
+          <a:prstGeom prst="bentConnector3">
+            <a:avLst>
+              <a:gd name="adj1" fmla="val 1800000"/>
+            </a:avLst>
+          </a:prstGeom>
+          <a:ln>
+            <a:solidFill>
+              <a:srgbClr val="002060"/>
+            </a:solidFill>
+          </a:ln>
+        </p:spPr>
+        <p:style>
+          <a:lnRef idx="1">
+            <a:schemeClr val="accent1"/>
+          </a:lnRef>
+          <a:fillRef idx="0">
+            <a:schemeClr val="accent1"/>
+          </a:fillRef>
+          <a:effectRef idx="0">
+            <a:schemeClr val="accent1"/>
+          </a:effectRef>
+          <a:fontRef idx="minor">
+            <a:schemeClr val="tx1"/>
+          </a:fontRef>
+        </p:style>
+      </p:cxnSp>
+      <p:cxnSp>
+        <p:nvCxnSpPr>
+          <p:cNvPr id="27" name="Straight Arrow Connector 26">
+            <a:extLst>
+              <a:ext uri="{FF2B5EF4-FFF2-40B4-BE49-F238E27FC236}">
+                <a16:creationId xmlns:a16="http://schemas.microsoft.com/office/drawing/2014/main" id="{94B9E28E-B302-E2EB-4DE5-AAAC71F4B68B}"/>
+              </a:ext>
+            </a:extLst>
+          </p:cNvPr>
+          <p:cNvCxnSpPr>
+            <a:cxnSpLocks/>
+          </p:cNvCxnSpPr>
+          <p:nvPr/>
+        </p:nvCxnSpPr>
+        <p:spPr>
+          <a:xfrm flipH="1">
+            <a:off x="7586599" y="3624994"/>
+            <a:ext cx="968724" cy="0"/>
+          </a:xfrm>
+          <a:prstGeom prst="straightConnector1">
+            <a:avLst/>
+          </a:prstGeom>
+          <a:ln>
+            <a:solidFill>
+              <a:srgbClr val="002060"/>
+            </a:solidFill>
+            <a:tailEnd type="triangle"/>
+          </a:ln>
+        </p:spPr>
+        <p:style>
+          <a:lnRef idx="1">
+            <a:schemeClr val="accent1"/>
+          </a:lnRef>
+          <a:fillRef idx="0">
+            <a:schemeClr val="accent1"/>
+          </a:fillRef>
+          <a:effectRef idx="0">
+            <a:schemeClr val="accent1"/>
+          </a:effectRef>
+          <a:fontRef idx="minor">
+            <a:schemeClr val="tx1"/>
+          </a:fontRef>
+        </p:style>
+      </p:cxnSp>
+      <p:cxnSp>
+        <p:nvCxnSpPr>
+          <p:cNvPr id="32" name="Straight Connector 31">
+            <a:extLst>
+              <a:ext uri="{FF2B5EF4-FFF2-40B4-BE49-F238E27FC236}">
+                <a16:creationId xmlns:a16="http://schemas.microsoft.com/office/drawing/2014/main" id="{5D20EFF9-14CC-13A9-93A0-0D364C8AA6F7}"/>
+              </a:ext>
+            </a:extLst>
+          </p:cNvPr>
+          <p:cNvCxnSpPr>
+            <a:cxnSpLocks/>
+            <a:stCxn id="17" idx="1"/>
+          </p:cNvCxnSpPr>
+          <p:nvPr/>
+        </p:nvCxnSpPr>
+        <p:spPr>
+          <a:xfrm flipH="1">
+            <a:off x="8555323" y="3540762"/>
+            <a:ext cx="207677" cy="0"/>
+          </a:xfrm>
+          <a:prstGeom prst="line">
+            <a:avLst/>
+          </a:prstGeom>
+          <a:ln>
+            <a:solidFill>
+              <a:srgbClr val="002060"/>
+            </a:solidFill>
+          </a:ln>
+        </p:spPr>
+        <p:style>
+          <a:lnRef idx="1">
+            <a:schemeClr val="accent1"/>
+          </a:lnRef>
+          <a:fillRef idx="0">
+            <a:schemeClr val="accent1"/>
+          </a:fillRef>
+          <a:effectRef idx="0">
+            <a:schemeClr val="accent1"/>
+          </a:effectRef>
+          <a:fontRef idx="minor">
+            <a:schemeClr val="tx1"/>
+          </a:fontRef>
+        </p:style>
+      </p:cxnSp>
+      <p:cxnSp>
+        <p:nvCxnSpPr>
+          <p:cNvPr id="34" name="Straight Connector 33">
+            <a:extLst>
+              <a:ext uri="{FF2B5EF4-FFF2-40B4-BE49-F238E27FC236}">
+                <a16:creationId xmlns:a16="http://schemas.microsoft.com/office/drawing/2014/main" id="{5C948921-0CFF-6FB7-254B-10DFD24BCFC8}"/>
+              </a:ext>
+            </a:extLst>
+          </p:cNvPr>
+          <p:cNvCxnSpPr>
+            <a:cxnSpLocks/>
+            <a:stCxn id="18" idx="1"/>
+          </p:cNvCxnSpPr>
+          <p:nvPr/>
+        </p:nvCxnSpPr>
+        <p:spPr>
+          <a:xfrm flipH="1">
+            <a:off x="8555323" y="4135382"/>
+            <a:ext cx="207677" cy="0"/>
+          </a:xfrm>
+          <a:prstGeom prst="line">
+            <a:avLst/>
+          </a:prstGeom>
+          <a:ln>
+            <a:solidFill>
+              <a:srgbClr val="002060"/>
+            </a:solidFill>
+          </a:ln>
+        </p:spPr>
+        <p:style>
+          <a:lnRef idx="1">
+            <a:schemeClr val="accent1"/>
+          </a:lnRef>
+          <a:fillRef idx="0">
+            <a:schemeClr val="accent1"/>
+          </a:fillRef>
+          <a:effectRef idx="0">
+            <a:schemeClr val="accent1"/>
+          </a:effectRef>
+          <a:fontRef idx="minor">
+            <a:schemeClr val="tx1"/>
+          </a:fontRef>
+        </p:style>
+      </p:cxnSp>
+      <p:cxnSp>
+        <p:nvCxnSpPr>
+          <p:cNvPr id="37" name="Straight Arrow Connector 36">
+            <a:extLst>
+              <a:ext uri="{FF2B5EF4-FFF2-40B4-BE49-F238E27FC236}">
+                <a16:creationId xmlns:a16="http://schemas.microsoft.com/office/drawing/2014/main" id="{57E87BB6-2738-788D-A881-D1E023E35EA3}"/>
+              </a:ext>
+            </a:extLst>
+          </p:cNvPr>
+          <p:cNvCxnSpPr>
+            <a:cxnSpLocks/>
+          </p:cNvCxnSpPr>
+          <p:nvPr/>
+        </p:nvCxnSpPr>
+        <p:spPr>
+          <a:xfrm>
+            <a:off x="7586599" y="3962400"/>
+            <a:ext cx="968724" cy="0"/>
+          </a:xfrm>
+          <a:prstGeom prst="straightConnector1">
+            <a:avLst/>
+          </a:prstGeom>
+          <a:ln>
+            <a:solidFill>
+              <a:srgbClr val="002060"/>
+            </a:solidFill>
+            <a:tailEnd type="triangle"/>
+          </a:ln>
+        </p:spPr>
+        <p:style>
+          <a:lnRef idx="1">
+            <a:schemeClr val="accent1"/>
+          </a:lnRef>
+          <a:fillRef idx="0">
+            <a:schemeClr val="accent1"/>
+          </a:fillRef>
+          <a:effectRef idx="0">
+            <a:schemeClr val="accent1"/>
+          </a:effectRef>
+          <a:fontRef idx="minor">
+            <a:schemeClr val="tx1"/>
+          </a:fontRef>
+        </p:style>
+      </p:cxnSp>
+      <p:sp>
+        <p:nvSpPr>
+          <p:cNvPr id="8" name="object 4">
+            <a:extLst>
+              <a:ext uri="{FF2B5EF4-FFF2-40B4-BE49-F238E27FC236}">
+                <a16:creationId xmlns:a16="http://schemas.microsoft.com/office/drawing/2014/main" id="{E33D91DB-63D6-A074-A349-ADEDFEF258CE}"/>
+              </a:ext>
+            </a:extLst>
+          </p:cNvPr>
+          <p:cNvSpPr txBox="1"/>
+          <p:nvPr/>
+        </p:nvSpPr>
+        <p:spPr>
+          <a:xfrm>
+            <a:off x="5169471" y="5287656"/>
+            <a:ext cx="1828800" cy="744435"/>
+          </a:xfrm>
+          <a:prstGeom prst="rect">
+            <a:avLst/>
+          </a:prstGeom>
+          <a:ln w="12700">
+            <a:solidFill>
+              <a:srgbClr val="001F5F"/>
+            </a:solidFill>
+          </a:ln>
+        </p:spPr>
+        <p:txBody>
+          <a:bodyPr vert="horz" wrap="square" lIns="0" tIns="5715" rIns="0" bIns="0" rtlCol="0">
+            <a:spAutoFit/>
+          </a:bodyPr>
+          <a:lstStyle/>
+          <a:p>
+            <a:pPr marL="173990" algn="ctr">
+              <a:lnSpc>
+                <a:spcPct val="100000"/>
+              </a:lnSpc>
+              <a:spcBef>
+                <a:spcPts val="5"/>
+              </a:spcBef>
+            </a:pPr>
+            <a:endParaRPr lang="en-US" sz="1600" spc="-10" dirty="0">
               <a:solidFill>
                 <a:srgbClr val="001F5F"/>
               </a:solidFill>
-            </a:ln>
-          </p:spPr>
-          <p:txBody>
-            <a:bodyPr wrap="square" lIns="0" tIns="0" rIns="0" bIns="0" rtlCol="0"/>
-            <a:lstStyle/>
-            <a:p>
-              <a:endParaRPr/>
-            </a:p>
-          </p:txBody>
-        </p:sp>
-        <p:sp>
-          <p:nvSpPr>
-            <p:cNvPr id="10" name="object 10"/>
-            <p:cNvSpPr/>
-            <p:nvPr/>
-          </p:nvSpPr>
-          <p:spPr>
-            <a:xfrm>
-              <a:off x="4504584" y="3761229"/>
-              <a:ext cx="76200" cy="76200"/>
-            </a:xfrm>
-            <a:custGeom>
-              <a:avLst/>
-              <a:gdLst/>
-              <a:ahLst/>
-              <a:cxnLst/>
-              <a:rect l="l" t="t" r="r" b="b"/>
-              <a:pathLst>
-                <a:path w="76200" h="76200">
-                  <a:moveTo>
-                    <a:pt x="0" y="0"/>
-                  </a:moveTo>
-                  <a:lnTo>
-                    <a:pt x="0" y="76199"/>
-                  </a:lnTo>
-                  <a:lnTo>
-                    <a:pt x="76200" y="38099"/>
-                  </a:lnTo>
-                  <a:lnTo>
-                    <a:pt x="0" y="0"/>
-                  </a:lnTo>
-                  <a:close/>
-                </a:path>
-              </a:pathLst>
-            </a:custGeom>
+              <a:latin typeface="Bahnschrift Light"/>
+              <a:cs typeface="Bahnschrift Light"/>
+            </a:endParaRPr>
+          </a:p>
+          <a:p>
+            <a:pPr marL="173990" algn="ctr">
+              <a:lnSpc>
+                <a:spcPct val="100000"/>
+              </a:lnSpc>
+              <a:spcBef>
+                <a:spcPts val="5"/>
+              </a:spcBef>
+            </a:pPr>
+            <a:r>
+              <a:rPr lang="en-US" sz="1600" spc="-10" dirty="0">
+                <a:solidFill>
+                  <a:srgbClr val="001F5F"/>
+                </a:solidFill>
+                <a:latin typeface="Bahnschrift Light"/>
+                <a:cs typeface="Bahnschrift Light"/>
+              </a:rPr>
+              <a:t>ADMIN</a:t>
+            </a:r>
+          </a:p>
+          <a:p>
+            <a:pPr marL="173990" algn="ctr">
+              <a:lnSpc>
+                <a:spcPct val="100000"/>
+              </a:lnSpc>
+              <a:spcBef>
+                <a:spcPts val="5"/>
+              </a:spcBef>
+            </a:pPr>
+            <a:endParaRPr lang="en-US" sz="1600" dirty="0">
+              <a:latin typeface="Bahnschrift Light"/>
+              <a:cs typeface="Bahnschrift Light"/>
+            </a:endParaRPr>
+          </a:p>
+        </p:txBody>
+      </p:sp>
+      <p:cxnSp>
+        <p:nvCxnSpPr>
+          <p:cNvPr id="12" name="Straight Arrow Connector 11">
+            <a:extLst>
+              <a:ext uri="{FF2B5EF4-FFF2-40B4-BE49-F238E27FC236}">
+                <a16:creationId xmlns:a16="http://schemas.microsoft.com/office/drawing/2014/main" id="{ADB2D9B2-1D0C-6E10-6580-652AF8815DB0}"/>
+              </a:ext>
+            </a:extLst>
+          </p:cNvPr>
+          <p:cNvCxnSpPr>
+            <a:stCxn id="8" idx="0"/>
+            <a:endCxn id="6" idx="2"/>
+          </p:cNvCxnSpPr>
+          <p:nvPr/>
+        </p:nvCxnSpPr>
+        <p:spPr>
+          <a:xfrm flipV="1">
+            <a:off x="6083871" y="4567681"/>
+            <a:ext cx="1" cy="719975"/>
+          </a:xfrm>
+          <a:prstGeom prst="straightConnector1">
+            <a:avLst/>
+          </a:prstGeom>
+          <a:ln>
             <a:solidFill>
-              <a:srgbClr val="001F5F"/>
+              <a:srgbClr val="002060"/>
             </a:solidFill>
-          </p:spPr>
-          <p:txBody>
-            <a:bodyPr wrap="square" lIns="0" tIns="0" rIns="0" bIns="0" rtlCol="0"/>
-            <a:lstStyle/>
-            <a:p>
-              <a:endParaRPr/>
-            </a:p>
-          </p:txBody>
-        </p:sp>
-        <p:sp>
-          <p:nvSpPr>
-            <p:cNvPr id="11" name="object 11"/>
-            <p:cNvSpPr/>
-            <p:nvPr/>
-          </p:nvSpPr>
-          <p:spPr>
-            <a:xfrm>
-              <a:off x="7649966" y="3799332"/>
-              <a:ext cx="1449705" cy="0"/>
-            </a:xfrm>
-            <a:custGeom>
-              <a:avLst/>
-              <a:gdLst/>
-              <a:ahLst/>
-              <a:cxnLst/>
-              <a:rect l="l" t="t" r="r" b="b"/>
-              <a:pathLst>
-                <a:path w="1449704">
-                  <a:moveTo>
-                    <a:pt x="1449476" y="0"/>
-                  </a:moveTo>
-                  <a:lnTo>
-                    <a:pt x="0" y="0"/>
-                  </a:lnTo>
-                </a:path>
-              </a:pathLst>
-            </a:custGeom>
-            <a:ln w="12700">
-              <a:solidFill>
-                <a:srgbClr val="001F5F"/>
-              </a:solidFill>
-            </a:ln>
-          </p:spPr>
-          <p:txBody>
-            <a:bodyPr wrap="square" lIns="0" tIns="0" rIns="0" bIns="0" rtlCol="0"/>
-            <a:lstStyle/>
-            <a:p>
-              <a:endParaRPr/>
-            </a:p>
-          </p:txBody>
-        </p:sp>
-        <p:sp>
-          <p:nvSpPr>
-            <p:cNvPr id="12" name="object 12"/>
-            <p:cNvSpPr/>
-            <p:nvPr/>
-          </p:nvSpPr>
-          <p:spPr>
-            <a:xfrm>
-              <a:off x="7586470" y="3761229"/>
-              <a:ext cx="76200" cy="76200"/>
-            </a:xfrm>
-            <a:custGeom>
-              <a:avLst/>
-              <a:gdLst/>
-              <a:ahLst/>
-              <a:cxnLst/>
-              <a:rect l="l" t="t" r="r" b="b"/>
-              <a:pathLst>
-                <a:path w="76200" h="76200">
-                  <a:moveTo>
-                    <a:pt x="76200" y="0"/>
-                  </a:moveTo>
-                  <a:lnTo>
-                    <a:pt x="0" y="38099"/>
-                  </a:lnTo>
-                  <a:lnTo>
-                    <a:pt x="76200" y="76199"/>
-                  </a:lnTo>
-                  <a:lnTo>
-                    <a:pt x="76200" y="0"/>
-                  </a:lnTo>
-                  <a:close/>
-                </a:path>
-              </a:pathLst>
-            </a:custGeom>
-            <a:solidFill>
-              <a:srgbClr val="001F5F"/>
-            </a:solidFill>
-          </p:spPr>
-          <p:txBody>
-            <a:bodyPr wrap="square" lIns="0" tIns="0" rIns="0" bIns="0" rtlCol="0"/>
-            <a:lstStyle/>
-            <a:p>
-              <a:endParaRPr/>
-            </a:p>
-          </p:txBody>
-        </p:sp>
-        <p:sp>
-          <p:nvSpPr>
-            <p:cNvPr id="13" name="object 13"/>
-            <p:cNvSpPr/>
-            <p:nvPr/>
-          </p:nvSpPr>
-          <p:spPr>
-            <a:xfrm>
-              <a:off x="2153408" y="2801113"/>
-              <a:ext cx="3930650" cy="563880"/>
-            </a:xfrm>
-            <a:custGeom>
-              <a:avLst/>
-              <a:gdLst/>
-              <a:ahLst/>
-              <a:cxnLst/>
-              <a:rect l="l" t="t" r="r" b="b"/>
-              <a:pathLst>
-                <a:path w="3930650" h="563879">
-                  <a:moveTo>
-                    <a:pt x="3930319" y="228600"/>
-                  </a:moveTo>
-                  <a:lnTo>
-                    <a:pt x="3930319" y="0"/>
-                  </a:lnTo>
-                  <a:lnTo>
-                    <a:pt x="0" y="0"/>
-                  </a:lnTo>
-                  <a:lnTo>
-                    <a:pt x="0" y="563816"/>
-                  </a:lnTo>
-                </a:path>
-              </a:pathLst>
-            </a:custGeom>
-            <a:ln w="12700">
-              <a:solidFill>
-                <a:srgbClr val="001F5F"/>
-              </a:solidFill>
-            </a:ln>
-          </p:spPr>
-          <p:txBody>
-            <a:bodyPr wrap="square" lIns="0" tIns="0" rIns="0" bIns="0" rtlCol="0"/>
-            <a:lstStyle/>
-            <a:p>
-              <a:endParaRPr/>
-            </a:p>
-          </p:txBody>
-        </p:sp>
-        <p:sp>
-          <p:nvSpPr>
-            <p:cNvPr id="14" name="object 14"/>
-            <p:cNvSpPr/>
-            <p:nvPr/>
-          </p:nvSpPr>
-          <p:spPr>
-            <a:xfrm>
-              <a:off x="2115314" y="3352236"/>
-              <a:ext cx="76200" cy="76200"/>
-            </a:xfrm>
-            <a:custGeom>
-              <a:avLst/>
-              <a:gdLst/>
-              <a:ahLst/>
-              <a:cxnLst/>
-              <a:rect l="l" t="t" r="r" b="b"/>
-              <a:pathLst>
-                <a:path w="76200" h="76200">
-                  <a:moveTo>
-                    <a:pt x="76200" y="0"/>
-                  </a:moveTo>
-                  <a:lnTo>
-                    <a:pt x="0" y="0"/>
-                  </a:lnTo>
-                  <a:lnTo>
-                    <a:pt x="38100" y="76200"/>
-                  </a:lnTo>
-                  <a:lnTo>
-                    <a:pt x="76200" y="0"/>
-                  </a:lnTo>
-                  <a:close/>
-                </a:path>
-              </a:pathLst>
-            </a:custGeom>
-            <a:solidFill>
-              <a:srgbClr val="001F5F"/>
-            </a:solidFill>
-          </p:spPr>
-          <p:txBody>
-            <a:bodyPr wrap="square" lIns="0" tIns="0" rIns="0" bIns="0" rtlCol="0"/>
-            <a:lstStyle/>
-            <a:p>
-              <a:endParaRPr/>
-            </a:p>
-          </p:txBody>
-        </p:sp>
-        <p:sp>
-          <p:nvSpPr>
-            <p:cNvPr id="15" name="object 15"/>
-            <p:cNvSpPr/>
-            <p:nvPr/>
-          </p:nvSpPr>
-          <p:spPr>
-            <a:xfrm>
-              <a:off x="6083807" y="4231645"/>
-              <a:ext cx="3930650" cy="563880"/>
-            </a:xfrm>
-            <a:custGeom>
-              <a:avLst/>
-              <a:gdLst/>
-              <a:ahLst/>
-              <a:cxnLst/>
-              <a:rect l="l" t="t" r="r" b="b"/>
-              <a:pathLst>
-                <a:path w="3930650" h="563879">
-                  <a:moveTo>
-                    <a:pt x="0" y="335216"/>
-                  </a:moveTo>
-                  <a:lnTo>
-                    <a:pt x="0" y="563816"/>
-                  </a:lnTo>
-                  <a:lnTo>
-                    <a:pt x="3930319" y="563816"/>
-                  </a:lnTo>
-                  <a:lnTo>
-                    <a:pt x="3930319" y="0"/>
-                  </a:lnTo>
-                </a:path>
-              </a:pathLst>
-            </a:custGeom>
-            <a:ln w="12700">
-              <a:solidFill>
-                <a:srgbClr val="001F5F"/>
-              </a:solidFill>
-            </a:ln>
-          </p:spPr>
-          <p:txBody>
-            <a:bodyPr wrap="square" lIns="0" tIns="0" rIns="0" bIns="0" rtlCol="0"/>
-            <a:lstStyle/>
-            <a:p>
-              <a:endParaRPr/>
-            </a:p>
-          </p:txBody>
-        </p:sp>
-        <p:sp>
-          <p:nvSpPr>
-            <p:cNvPr id="16" name="object 16"/>
-            <p:cNvSpPr/>
-            <p:nvPr/>
-          </p:nvSpPr>
-          <p:spPr>
-            <a:xfrm>
-              <a:off x="9976019" y="4168138"/>
-              <a:ext cx="76200" cy="76200"/>
-            </a:xfrm>
-            <a:custGeom>
-              <a:avLst/>
-              <a:gdLst/>
-              <a:ahLst/>
-              <a:cxnLst/>
-              <a:rect l="l" t="t" r="r" b="b"/>
-              <a:pathLst>
-                <a:path w="76200" h="76200">
-                  <a:moveTo>
-                    <a:pt x="38100" y="0"/>
-                  </a:moveTo>
-                  <a:lnTo>
-                    <a:pt x="0" y="76200"/>
-                  </a:lnTo>
-                  <a:lnTo>
-                    <a:pt x="76200" y="76200"/>
-                  </a:lnTo>
-                  <a:lnTo>
-                    <a:pt x="38100" y="0"/>
-                  </a:lnTo>
-                  <a:close/>
-                </a:path>
-              </a:pathLst>
-            </a:custGeom>
-            <a:solidFill>
-              <a:srgbClr val="001F5F"/>
-            </a:solidFill>
-          </p:spPr>
-          <p:txBody>
-            <a:bodyPr wrap="square" lIns="0" tIns="0" rIns="0" bIns="0" rtlCol="0"/>
-            <a:lstStyle/>
-            <a:p>
-              <a:endParaRPr/>
-            </a:p>
-          </p:txBody>
-        </p:sp>
-      </p:grpSp>
+            <a:tailEnd type="triangle"/>
+          </a:ln>
+        </p:spPr>
+        <p:style>
+          <a:lnRef idx="1">
+            <a:schemeClr val="accent1"/>
+          </a:lnRef>
+          <a:fillRef idx="0">
+            <a:schemeClr val="accent1"/>
+          </a:fillRef>
+          <a:effectRef idx="0">
+            <a:schemeClr val="accent1"/>
+          </a:effectRef>
+          <a:fontRef idx="minor">
+            <a:schemeClr val="tx1"/>
+          </a:fontRef>
+        </p:style>
+      </p:cxnSp>
     </p:spTree>
   </p:cSld>
   <p:clrMapOvr>
@@ -13086,7 +13559,7 @@
           <p:nvPr>
             <p:extLst>
               <p:ext uri="{D42A27DB-BD31-4B8C-83A1-F6EECF244321}">
-                <p14:modId xmlns:p14="http://schemas.microsoft.com/office/powerpoint/2010/main" val="3264252471"/>
+                <p14:modId xmlns:p14="http://schemas.microsoft.com/office/powerpoint/2010/main" val="1360846419"/>
               </p:ext>
             </p:extLst>
           </p:nvPr>
@@ -13138,18 +13611,12 @@
             </a:pPr>
             <a:r>
               <a:rPr lang="en-US" b="1" dirty="0">
-                <a:solidFill>
-                  <a:srgbClr val="FFFF00"/>
-                </a:solidFill>
                 <a:latin typeface="Calibri"/>
                 <a:cs typeface="Calibri"/>
               </a:rPr>
               <a:t>PROJECT PROPOSAL</a:t>
             </a:r>
             <a:endParaRPr sz="1800" b="1" dirty="0">
-              <a:solidFill>
-                <a:srgbClr val="FFFF00"/>
-              </a:solidFill>
               <a:latin typeface="Calibri"/>
               <a:cs typeface="Calibri"/>
             </a:endParaRPr>
@@ -13193,18 +13660,12 @@
             </a:pPr>
             <a:r>
               <a:rPr lang="en-US" b="1" dirty="0">
-                <a:solidFill>
-                  <a:srgbClr val="FFFF00"/>
-                </a:solidFill>
                 <a:latin typeface="Calibri"/>
                 <a:cs typeface="Calibri"/>
               </a:rPr>
               <a:t>LITERATURE REVIEW</a:t>
             </a:r>
             <a:endParaRPr sz="1800" b="1" dirty="0">
-              <a:solidFill>
-                <a:srgbClr val="FFFF00"/>
-              </a:solidFill>
               <a:latin typeface="Calibri"/>
               <a:cs typeface="Calibri"/>
             </a:endParaRPr>
@@ -13248,18 +13709,12 @@
             </a:pPr>
             <a:r>
               <a:rPr lang="en-US" b="1" dirty="0">
-                <a:solidFill>
-                  <a:srgbClr val="FFFF00"/>
-                </a:solidFill>
                 <a:latin typeface="Calibri"/>
                 <a:cs typeface="Calibri"/>
               </a:rPr>
               <a:t>REQ. SPECIFICATION</a:t>
             </a:r>
             <a:endParaRPr sz="1800" b="1" dirty="0">
-              <a:solidFill>
-                <a:srgbClr val="FFFF00"/>
-              </a:solidFill>
               <a:latin typeface="Calibri"/>
               <a:cs typeface="Calibri"/>
             </a:endParaRPr>
@@ -13303,18 +13758,12 @@
             </a:pPr>
             <a:r>
               <a:rPr lang="en-US" b="1" dirty="0">
-                <a:solidFill>
-                  <a:srgbClr val="FFFF00"/>
-                </a:solidFill>
                 <a:latin typeface="Calibri"/>
                 <a:cs typeface="Calibri"/>
               </a:rPr>
               <a:t>UI/UX DESIGN</a:t>
             </a:r>
             <a:endParaRPr sz="1800" b="1" dirty="0">
-              <a:solidFill>
-                <a:srgbClr val="FFFF00"/>
-              </a:solidFill>
               <a:latin typeface="Calibri"/>
               <a:cs typeface="Calibri"/>
             </a:endParaRPr>
@@ -13358,18 +13807,12 @@
             </a:pPr>
             <a:r>
               <a:rPr lang="en-US" sz="1800" b="1" dirty="0">
-                <a:solidFill>
-                  <a:srgbClr val="FFFF00"/>
-                </a:solidFill>
                 <a:latin typeface="Calibri"/>
                 <a:cs typeface="Calibri"/>
               </a:rPr>
               <a:t>SYSTEM DESIGN</a:t>
             </a:r>
             <a:endParaRPr sz="1800" b="1" dirty="0">
-              <a:solidFill>
-                <a:srgbClr val="FFFF00"/>
-              </a:solidFill>
               <a:latin typeface="Calibri"/>
               <a:cs typeface="Calibri"/>
             </a:endParaRPr>
@@ -13413,18 +13856,12 @@
             </a:pPr>
             <a:r>
               <a:rPr lang="en-US" b="1" dirty="0">
-                <a:solidFill>
-                  <a:srgbClr val="FFFF00"/>
-                </a:solidFill>
                 <a:latin typeface="Calibri"/>
                 <a:cs typeface="Calibri"/>
               </a:rPr>
               <a:t>SYSTEM TESTING</a:t>
             </a:r>
             <a:endParaRPr sz="1800" b="1" dirty="0">
-              <a:solidFill>
-                <a:srgbClr val="FFFF00"/>
-              </a:solidFill>
               <a:latin typeface="Calibri"/>
               <a:cs typeface="Calibri"/>
             </a:endParaRPr>
@@ -13468,18 +13905,12 @@
             </a:pPr>
             <a:r>
               <a:rPr lang="en-US" sz="1800" b="1" dirty="0">
-                <a:solidFill>
-                  <a:srgbClr val="FFFF00"/>
-                </a:solidFill>
                 <a:latin typeface="Calibri"/>
                 <a:cs typeface="Calibri"/>
               </a:rPr>
               <a:t>SYS. DOCUMENTATION</a:t>
             </a:r>
             <a:endParaRPr sz="1800" b="1" dirty="0">
-              <a:solidFill>
-                <a:srgbClr val="FFFF00"/>
-              </a:solidFill>
               <a:latin typeface="Calibri"/>
               <a:cs typeface="Calibri"/>
             </a:endParaRPr>
@@ -13523,18 +13954,12 @@
             </a:pPr>
             <a:r>
               <a:rPr lang="en-US" b="1" dirty="0">
-                <a:solidFill>
-                  <a:srgbClr val="FFFF00"/>
-                </a:solidFill>
                 <a:latin typeface="Calibri"/>
                 <a:cs typeface="Calibri"/>
               </a:rPr>
               <a:t>OCT</a:t>
             </a:r>
             <a:endParaRPr sz="1800" b="1" dirty="0">
-              <a:solidFill>
-                <a:srgbClr val="FFFF00"/>
-              </a:solidFill>
               <a:latin typeface="Calibri"/>
               <a:cs typeface="Calibri"/>
             </a:endParaRPr>
@@ -13578,18 +14003,12 @@
             </a:pPr>
             <a:r>
               <a:rPr lang="en-US" b="1" dirty="0">
-                <a:solidFill>
-                  <a:srgbClr val="FFFF00"/>
-                </a:solidFill>
                 <a:latin typeface="Calibri"/>
                 <a:cs typeface="Calibri"/>
               </a:rPr>
               <a:t>JAN</a:t>
             </a:r>
             <a:endParaRPr sz="1800" b="1" dirty="0">
-              <a:solidFill>
-                <a:srgbClr val="FFFF00"/>
-              </a:solidFill>
               <a:latin typeface="Calibri"/>
               <a:cs typeface="Calibri"/>
             </a:endParaRPr>
@@ -13633,18 +14052,12 @@
             </a:pPr>
             <a:r>
               <a:rPr lang="en-US" b="1" dirty="0">
-                <a:solidFill>
-                  <a:srgbClr val="FFFF00"/>
-                </a:solidFill>
                 <a:latin typeface="Calibri"/>
                 <a:cs typeface="Calibri"/>
               </a:rPr>
               <a:t>FEB</a:t>
             </a:r>
             <a:endParaRPr sz="1800" b="1" dirty="0">
-              <a:solidFill>
-                <a:srgbClr val="FFFF00"/>
-              </a:solidFill>
               <a:latin typeface="Calibri"/>
               <a:cs typeface="Calibri"/>
             </a:endParaRPr>
@@ -13688,18 +14101,12 @@
             </a:pPr>
             <a:r>
               <a:rPr lang="en-US" b="1" dirty="0">
-                <a:solidFill>
-                  <a:srgbClr val="FFFF00"/>
-                </a:solidFill>
                 <a:latin typeface="Calibri"/>
                 <a:cs typeface="Calibri"/>
               </a:rPr>
               <a:t>MAR</a:t>
             </a:r>
             <a:endParaRPr sz="1800" b="1" dirty="0">
-              <a:solidFill>
-                <a:srgbClr val="FFFF00"/>
-              </a:solidFill>
               <a:latin typeface="Calibri"/>
               <a:cs typeface="Calibri"/>
             </a:endParaRPr>
@@ -13743,18 +14150,12 @@
             </a:pPr>
             <a:r>
               <a:rPr lang="en-US" b="1" dirty="0">
-                <a:solidFill>
-                  <a:srgbClr val="FFFF00"/>
-                </a:solidFill>
                 <a:latin typeface="Calibri"/>
                 <a:cs typeface="Calibri"/>
               </a:rPr>
               <a:t>APR</a:t>
             </a:r>
             <a:endParaRPr sz="1800" b="1" dirty="0">
-              <a:solidFill>
-                <a:srgbClr val="FFFF00"/>
-              </a:solidFill>
               <a:latin typeface="Calibri"/>
               <a:cs typeface="Calibri"/>
             </a:endParaRPr>
@@ -13798,18 +14199,12 @@
             </a:pPr>
             <a:r>
               <a:rPr lang="en-US" b="1" dirty="0">
-                <a:solidFill>
-                  <a:srgbClr val="FFFF00"/>
-                </a:solidFill>
                 <a:latin typeface="Calibri"/>
                 <a:cs typeface="Calibri"/>
               </a:rPr>
               <a:t>MAY</a:t>
             </a:r>
             <a:endParaRPr sz="1800" b="1" dirty="0">
-              <a:solidFill>
-                <a:srgbClr val="FFFF00"/>
-              </a:solidFill>
               <a:latin typeface="Calibri"/>
               <a:cs typeface="Calibri"/>
             </a:endParaRPr>
@@ -13853,18 +14248,12 @@
             </a:pPr>
             <a:r>
               <a:rPr lang="en-US" b="1" dirty="0">
-                <a:solidFill>
-                  <a:srgbClr val="FFFF00"/>
-                </a:solidFill>
                 <a:latin typeface="Calibri"/>
                 <a:cs typeface="Calibri"/>
               </a:rPr>
               <a:t>JUN</a:t>
             </a:r>
             <a:endParaRPr sz="1800" b="1" dirty="0">
-              <a:solidFill>
-                <a:srgbClr val="FFFF00"/>
-              </a:solidFill>
               <a:latin typeface="Calibri"/>
               <a:cs typeface="Calibri"/>
             </a:endParaRPr>
@@ -13908,18 +14297,12 @@
             </a:pPr>
             <a:r>
               <a:rPr lang="en-US" b="1" dirty="0">
-                <a:solidFill>
-                  <a:srgbClr val="FFFF00"/>
-                </a:solidFill>
                 <a:latin typeface="Calibri"/>
                 <a:cs typeface="Calibri"/>
               </a:rPr>
               <a:t>JUL</a:t>
             </a:r>
             <a:endParaRPr sz="1800" b="1" dirty="0">
-              <a:solidFill>
-                <a:srgbClr val="FFFF00"/>
-              </a:solidFill>
               <a:latin typeface="Calibri"/>
               <a:cs typeface="Calibri"/>
             </a:endParaRPr>
@@ -13963,18 +14346,12 @@
             </a:pPr>
             <a:r>
               <a:rPr lang="en-US" b="1" dirty="0">
-                <a:solidFill>
-                  <a:srgbClr val="FFFF00"/>
-                </a:solidFill>
                 <a:latin typeface="Calibri"/>
                 <a:cs typeface="Calibri"/>
               </a:rPr>
               <a:t>AUG</a:t>
             </a:r>
             <a:endParaRPr sz="1800" b="1" dirty="0">
-              <a:solidFill>
-                <a:srgbClr val="FFFF00"/>
-              </a:solidFill>
               <a:latin typeface="Calibri"/>
               <a:cs typeface="Calibri"/>
             </a:endParaRPr>
@@ -14018,18 +14395,12 @@
             </a:pPr>
             <a:r>
               <a:rPr lang="en-US" b="1" dirty="0">
-                <a:solidFill>
-                  <a:srgbClr val="FFFF00"/>
-                </a:solidFill>
                 <a:latin typeface="Calibri"/>
                 <a:cs typeface="Calibri"/>
               </a:rPr>
               <a:t>SEPT</a:t>
             </a:r>
             <a:endParaRPr sz="1800" b="1" dirty="0">
-              <a:solidFill>
-                <a:srgbClr val="FFFF00"/>
-              </a:solidFill>
               <a:latin typeface="Calibri"/>
               <a:cs typeface="Calibri"/>
             </a:endParaRPr>
@@ -14073,18 +14444,12 @@
             </a:pPr>
             <a:r>
               <a:rPr lang="en-US" b="1" dirty="0">
-                <a:solidFill>
-                  <a:srgbClr val="FFFF00"/>
-                </a:solidFill>
                 <a:latin typeface="Calibri"/>
                 <a:cs typeface="Calibri"/>
               </a:rPr>
               <a:t>OCT</a:t>
             </a:r>
             <a:endParaRPr sz="1800" b="1" dirty="0">
-              <a:solidFill>
-                <a:srgbClr val="FFFF00"/>
-              </a:solidFill>
               <a:latin typeface="Calibri"/>
               <a:cs typeface="Calibri"/>
             </a:endParaRPr>
@@ -14128,18 +14493,12 @@
             </a:pPr>
             <a:r>
               <a:rPr lang="en-US" b="1" dirty="0">
-                <a:solidFill>
-                  <a:srgbClr val="FFFF00"/>
-                </a:solidFill>
                 <a:latin typeface="Calibri"/>
                 <a:cs typeface="Calibri"/>
               </a:rPr>
               <a:t>NOV</a:t>
             </a:r>
             <a:endParaRPr sz="1800" b="1" dirty="0">
-              <a:solidFill>
-                <a:srgbClr val="FFFF00"/>
-              </a:solidFill>
               <a:latin typeface="Calibri"/>
               <a:cs typeface="Calibri"/>
             </a:endParaRPr>
@@ -14183,18 +14542,12 @@
             </a:pPr>
             <a:r>
               <a:rPr lang="en-US" b="1" dirty="0">
-                <a:solidFill>
-                  <a:srgbClr val="FFFF00"/>
-                </a:solidFill>
                 <a:latin typeface="Calibri"/>
                 <a:cs typeface="Calibri"/>
               </a:rPr>
               <a:t>DEC</a:t>
             </a:r>
             <a:endParaRPr sz="1800" b="1" dirty="0">
-              <a:solidFill>
-                <a:srgbClr val="FFFF00"/>
-              </a:solidFill>
               <a:latin typeface="Calibri"/>
               <a:cs typeface="Calibri"/>
             </a:endParaRPr>
@@ -14230,11 +14583,7 @@
           <a:lstStyle/>
           <a:p>
             <a:r>
-              <a:rPr lang="en-US" b="1" dirty="0">
-                <a:solidFill>
-                  <a:srgbClr val="FFFF00"/>
-                </a:solidFill>
-              </a:rPr>
+              <a:rPr lang="en-US" b="1" dirty="0"/>
               <a:t>DEVELOPMENT</a:t>
             </a:r>
           </a:p>

</xml_diff>

<commit_message>
progree: added status field to Lender schema
</commit_message>
<xml_diff>
--- a/documentation/Amastata - Project Proposal.pptx
+++ b/documentation/Amastata - Project Proposal.pptx
@@ -1186,7 +1186,7 @@
           <a:p>
             <a:fld id="{EABB664E-6B3E-4A6E-8882-B268D5FD83C7}" type="datetimeFigureOut">
               <a:rPr lang="en-US" smtClean="0"/>
-              <a:t>9/18/2023</a:t>
+              <a:t>9/29/2023</a:t>
             </a:fld>
             <a:endParaRPr lang="en-US"/>
           </a:p>
@@ -1680,7 +1680,7 @@
           <a:p>
             <a:fld id="{1D8BD707-D9CF-40AE-B4C6-C98DA3205C09}" type="datetimeFigureOut">
               <a:rPr lang="en-US"/>
-              <a:t>9/18/2023</a:t>
+              <a:t>9/29/2023</a:t>
             </a:fld>
             <a:endParaRPr lang="en-US"/>
           </a:p>
@@ -1855,7 +1855,7 @@
           <a:p>
             <a:fld id="{1D8BD707-D9CF-40AE-B4C6-C98DA3205C09}" type="datetimeFigureOut">
               <a:rPr lang="en-US"/>
-              <a:t>9/18/2023</a:t>
+              <a:t>9/29/2023</a:t>
             </a:fld>
             <a:endParaRPr lang="en-US"/>
           </a:p>
@@ -2081,7 +2081,7 @@
           <a:p>
             <a:fld id="{1D8BD707-D9CF-40AE-B4C6-C98DA3205C09}" type="datetimeFigureOut">
               <a:rPr lang="en-US"/>
-              <a:t>9/18/2023</a:t>
+              <a:t>9/29/2023</a:t>
             </a:fld>
             <a:endParaRPr lang="en-US"/>
           </a:p>
@@ -2309,7 +2309,7 @@
           <a:p>
             <a:fld id="{1D8BD707-D9CF-40AE-B4C6-C98DA3205C09}" type="datetimeFigureOut">
               <a:rPr lang="en-US"/>
-              <a:t>9/18/2023</a:t>
+              <a:t>9/29/2023</a:t>
             </a:fld>
             <a:endParaRPr lang="en-US"/>
           </a:p>
@@ -2428,7 +2428,7 @@
           <a:p>
             <a:fld id="{1D8BD707-D9CF-40AE-B4C6-C98DA3205C09}" type="datetimeFigureOut">
               <a:rPr lang="en-US"/>
-              <a:t>9/18/2023</a:t>
+              <a:t>9/29/2023</a:t>
             </a:fld>
             <a:endParaRPr lang="en-US"/>
           </a:p>
@@ -2673,7 +2673,7 @@
           <a:p>
             <a:fld id="{1D8BD707-D9CF-40AE-B4C6-C98DA3205C09}" type="datetimeFigureOut">
               <a:rPr lang="en-US"/>
-              <a:t>9/18/2023</a:t>
+              <a:t>9/29/2023</a:t>
             </a:fld>
             <a:endParaRPr lang="en-US"/>
           </a:p>
@@ -10356,1202 +10356,1223 @@
           </a:p>
         </p:txBody>
       </p:sp>
-      <p:sp>
-        <p:nvSpPr>
-          <p:cNvPr id="4" name="object 4"/>
-          <p:cNvSpPr txBox="1"/>
+      <p:grpSp>
+        <p:nvGrpSpPr>
+          <p:cNvPr id="11" name="Group 10">
+            <a:extLst>
+              <a:ext uri="{FF2B5EF4-FFF2-40B4-BE49-F238E27FC236}">
+                <a16:creationId xmlns:a16="http://schemas.microsoft.com/office/drawing/2014/main" id="{D67EA135-690A-4F34-55B3-7D67F55A9AD5}"/>
+              </a:ext>
+            </a:extLst>
+          </p:cNvPr>
+          <p:cNvGrpSpPr/>
           <p:nvPr/>
-        </p:nvSpPr>
-        <p:spPr>
+        </p:nvGrpSpPr>
+        <p:grpSpPr>
           <a:xfrm>
-            <a:off x="1239011" y="3429000"/>
-            <a:ext cx="1828800" cy="739140"/>
+            <a:off x="1239011" y="2743200"/>
+            <a:ext cx="10387585" cy="3288891"/>
+            <a:chOff x="1239011" y="2743200"/>
+            <a:chExt cx="10387585" cy="3288891"/>
           </a:xfrm>
-          <a:prstGeom prst="rect">
-            <a:avLst/>
-          </a:prstGeom>
-          <a:ln w="12700">
+        </p:grpSpPr>
+        <p:sp>
+          <p:nvSpPr>
+            <p:cNvPr id="4" name="object 4"/>
+            <p:cNvSpPr txBox="1"/>
+            <p:nvPr/>
+          </p:nvSpPr>
+          <p:spPr>
+            <a:xfrm>
+              <a:off x="1239011" y="3429000"/>
+              <a:ext cx="1828800" cy="739140"/>
+            </a:xfrm>
+            <a:prstGeom prst="rect">
+              <a:avLst/>
+            </a:prstGeom>
+            <a:ln w="12700">
+              <a:solidFill>
+                <a:srgbClr val="001F5F"/>
+              </a:solidFill>
+            </a:ln>
+          </p:spPr>
+          <p:txBody>
+            <a:bodyPr vert="horz" wrap="square" lIns="0" tIns="5715" rIns="0" bIns="0" rtlCol="0">
+              <a:spAutoFit/>
+            </a:bodyPr>
+            <a:lstStyle/>
+            <a:p>
+              <a:pPr>
+                <a:lnSpc>
+                  <a:spcPct val="100000"/>
+                </a:lnSpc>
+                <a:spcBef>
+                  <a:spcPts val="45"/>
+                </a:spcBef>
+              </a:pPr>
+              <a:endParaRPr sz="1650" dirty="0">
+                <a:latin typeface="Times New Roman"/>
+                <a:cs typeface="Times New Roman"/>
+              </a:endParaRPr>
+            </a:p>
+            <a:p>
+              <a:pPr marL="173990">
+                <a:lnSpc>
+                  <a:spcPct val="100000"/>
+                </a:lnSpc>
+                <a:spcBef>
+                  <a:spcPts val="5"/>
+                </a:spcBef>
+              </a:pPr>
+              <a:r>
+                <a:rPr sz="1600" b="0" spc="-10" dirty="0">
+                  <a:solidFill>
+                    <a:srgbClr val="001F5F"/>
+                  </a:solidFill>
+                  <a:latin typeface="Bahnschrift Light"/>
+                  <a:cs typeface="Bahnschrift Light"/>
+                </a:rPr>
+                <a:t>CLIENT/DEBTOR</a:t>
+              </a:r>
+              <a:endParaRPr sz="1600" dirty="0">
+                <a:latin typeface="Bahnschrift Light"/>
+                <a:cs typeface="Bahnschrift Light"/>
+              </a:endParaRPr>
+            </a:p>
+          </p:txBody>
+        </p:sp>
+        <p:sp>
+          <p:nvSpPr>
+            <p:cNvPr id="5" name="object 5"/>
+            <p:cNvSpPr/>
+            <p:nvPr/>
+          </p:nvSpPr>
+          <p:spPr>
+            <a:xfrm>
+              <a:off x="4581144" y="3029711"/>
+              <a:ext cx="3005455" cy="1537970"/>
+            </a:xfrm>
+            <a:custGeom>
+              <a:avLst/>
+              <a:gdLst/>
+              <a:ahLst/>
+              <a:cxnLst/>
+              <a:rect l="l" t="t" r="r" b="b"/>
+              <a:pathLst>
+                <a:path w="3005454" h="1537970">
+                  <a:moveTo>
+                    <a:pt x="0" y="0"/>
+                  </a:moveTo>
+                  <a:lnTo>
+                    <a:pt x="3005328" y="0"/>
+                  </a:lnTo>
+                  <a:lnTo>
+                    <a:pt x="3005328" y="1537715"/>
+                  </a:lnTo>
+                  <a:lnTo>
+                    <a:pt x="0" y="1537715"/>
+                  </a:lnTo>
+                  <a:lnTo>
+                    <a:pt x="0" y="0"/>
+                  </a:lnTo>
+                  <a:close/>
+                </a:path>
+              </a:pathLst>
+            </a:custGeom>
+            <a:ln w="12700">
+              <a:solidFill>
+                <a:srgbClr val="001F5F"/>
+              </a:solidFill>
+            </a:ln>
+          </p:spPr>
+          <p:txBody>
+            <a:bodyPr wrap="square" lIns="0" tIns="0" rIns="0" bIns="0" rtlCol="0"/>
+            <a:lstStyle/>
+            <a:p>
+              <a:endParaRPr/>
+            </a:p>
+          </p:txBody>
+        </p:sp>
+        <p:sp>
+          <p:nvSpPr>
+            <p:cNvPr id="6" name="object 6"/>
+            <p:cNvSpPr txBox="1"/>
+            <p:nvPr/>
+          </p:nvSpPr>
+          <p:spPr>
+            <a:xfrm>
+              <a:off x="4581144" y="3029711"/>
+              <a:ext cx="3005455" cy="1537970"/>
+            </a:xfrm>
+            <a:prstGeom prst="rect">
+              <a:avLst/>
+            </a:prstGeom>
+            <a:ln w="12700">
+              <a:solidFill>
+                <a:srgbClr val="001F5F"/>
+              </a:solidFill>
+            </a:ln>
+          </p:spPr>
+          <p:txBody>
+            <a:bodyPr vert="horz" wrap="square" lIns="0" tIns="5080" rIns="0" bIns="0" rtlCol="0">
+              <a:spAutoFit/>
+            </a:bodyPr>
+            <a:lstStyle/>
+            <a:p>
+              <a:pPr>
+                <a:lnSpc>
+                  <a:spcPct val="100000"/>
+                </a:lnSpc>
+                <a:spcBef>
+                  <a:spcPts val="40"/>
+                </a:spcBef>
+              </a:pPr>
+              <a:endParaRPr sz="2400" dirty="0">
+                <a:latin typeface="Times New Roman"/>
+                <a:cs typeface="Times New Roman"/>
+              </a:endParaRPr>
+            </a:p>
+            <a:p>
+              <a:pPr marL="310515" marR="303530" indent="-635" algn="ctr">
+                <a:lnSpc>
+                  <a:spcPct val="100000"/>
+                </a:lnSpc>
+              </a:pPr>
+              <a:r>
+                <a:rPr sz="1800" b="0" spc="-5" dirty="0">
+                  <a:solidFill>
+                    <a:srgbClr val="001F5F"/>
+                  </a:solidFill>
+                  <a:latin typeface="Bahnschrift Light"/>
+                  <a:cs typeface="Bahnschrift Light"/>
+                </a:rPr>
+                <a:t>CENTRALIZED LOAN </a:t>
+              </a:r>
+              <a:r>
+                <a:rPr sz="1800" b="0" dirty="0">
+                  <a:solidFill>
+                    <a:srgbClr val="001F5F"/>
+                  </a:solidFill>
+                  <a:latin typeface="Bahnschrift Light"/>
+                  <a:cs typeface="Bahnschrift Light"/>
+                </a:rPr>
+                <a:t> </a:t>
+              </a:r>
+              <a:r>
+                <a:rPr sz="1800" b="0" spc="-5" dirty="0">
+                  <a:solidFill>
+                    <a:srgbClr val="001F5F"/>
+                  </a:solidFill>
+                  <a:latin typeface="Bahnschrift Light"/>
+                  <a:cs typeface="Bahnschrift Light"/>
+                </a:rPr>
+                <a:t>APPLICATION </a:t>
+              </a:r>
+              <a:r>
+                <a:rPr sz="1800" b="0" dirty="0">
+                  <a:solidFill>
+                    <a:srgbClr val="001F5F"/>
+                  </a:solidFill>
+                  <a:latin typeface="Bahnschrift Light"/>
+                  <a:cs typeface="Bahnschrift Light"/>
+                </a:rPr>
+                <a:t> </a:t>
+              </a:r>
+              <a:r>
+                <a:rPr sz="1800" b="0" spc="-5" dirty="0">
+                  <a:solidFill>
+                    <a:srgbClr val="001F5F"/>
+                  </a:solidFill>
+                  <a:latin typeface="Bahnschrift Light"/>
+                  <a:cs typeface="Bahnschrift Light"/>
+                </a:rPr>
+                <a:t>MANAGEMENT</a:t>
+              </a:r>
+              <a:r>
+                <a:rPr sz="1800" b="0" spc="-80" dirty="0">
+                  <a:solidFill>
+                    <a:srgbClr val="001F5F"/>
+                  </a:solidFill>
+                  <a:latin typeface="Bahnschrift Light"/>
+                  <a:cs typeface="Bahnschrift Light"/>
+                </a:rPr>
+                <a:t> </a:t>
+              </a:r>
+              <a:r>
+                <a:rPr sz="1800" b="0" spc="-5" dirty="0">
+                  <a:solidFill>
+                    <a:srgbClr val="001F5F"/>
+                  </a:solidFill>
+                  <a:latin typeface="Bahnschrift Light"/>
+                  <a:cs typeface="Bahnschrift Light"/>
+                </a:rPr>
+                <a:t>SYSTEM</a:t>
+              </a:r>
+              <a:endParaRPr sz="1800" dirty="0">
+                <a:latin typeface="Bahnschrift Light"/>
+                <a:cs typeface="Bahnschrift Light"/>
+              </a:endParaRPr>
+            </a:p>
+          </p:txBody>
+        </p:sp>
+        <p:sp>
+          <p:nvSpPr>
+            <p:cNvPr id="7" name="object 7"/>
+            <p:cNvSpPr txBox="1"/>
+            <p:nvPr/>
+          </p:nvSpPr>
+          <p:spPr>
+            <a:xfrm>
+              <a:off x="8763000" y="2743200"/>
+              <a:ext cx="2863596" cy="340478"/>
+            </a:xfrm>
+            <a:prstGeom prst="rect">
+              <a:avLst/>
+            </a:prstGeom>
+            <a:ln w="12700">
+              <a:solidFill>
+                <a:srgbClr val="001F5F"/>
+              </a:solidFill>
+            </a:ln>
+          </p:spPr>
+          <p:txBody>
+            <a:bodyPr vert="horz" wrap="square" lIns="0" tIns="93345" rIns="0" bIns="0" rtlCol="0">
+              <a:spAutoFit/>
+            </a:bodyPr>
+            <a:lstStyle/>
+            <a:p>
+              <a:pPr marL="276225" marR="98425" indent="-170815">
+                <a:lnSpc>
+                  <a:spcPct val="100000"/>
+                </a:lnSpc>
+                <a:spcBef>
+                  <a:spcPts val="735"/>
+                </a:spcBef>
+              </a:pPr>
+              <a:r>
+                <a:rPr lang="en-US" sz="1600" b="0" dirty="0">
+                  <a:solidFill>
+                    <a:srgbClr val="001F5F"/>
+                  </a:solidFill>
+                  <a:latin typeface="Bahnschrift Light"/>
+                  <a:cs typeface="Bahnschrift Light"/>
+                </a:rPr>
+                <a:t>M</a:t>
+              </a:r>
+              <a:r>
+                <a:rPr lang="en-US" sz="1600" b="0" spc="-5" dirty="0">
+                  <a:solidFill>
+                    <a:srgbClr val="001F5F"/>
+                  </a:solidFill>
+                  <a:latin typeface="Bahnschrift Light"/>
+                  <a:cs typeface="Bahnschrift Light"/>
+                </a:rPr>
+                <a:t>i</a:t>
+              </a:r>
+              <a:r>
+                <a:rPr lang="en-US" sz="1600" b="0" dirty="0">
+                  <a:solidFill>
+                    <a:srgbClr val="001F5F"/>
+                  </a:solidFill>
+                  <a:latin typeface="Bahnschrift Light"/>
+                  <a:cs typeface="Bahnschrift Light"/>
+                </a:rPr>
+                <a:t>crof</a:t>
+              </a:r>
+              <a:r>
+                <a:rPr lang="en-US" sz="1600" b="0" spc="-5" dirty="0">
+                  <a:solidFill>
+                    <a:srgbClr val="001F5F"/>
+                  </a:solidFill>
+                  <a:latin typeface="Bahnschrift Light"/>
+                  <a:cs typeface="Bahnschrift Light"/>
+                </a:rPr>
+                <a:t>inan</a:t>
+              </a:r>
+              <a:r>
+                <a:rPr lang="en-US" sz="1600" b="0" dirty="0">
+                  <a:solidFill>
+                    <a:srgbClr val="001F5F"/>
+                  </a:solidFill>
+                  <a:latin typeface="Bahnschrift Light"/>
+                  <a:cs typeface="Bahnschrift Light"/>
+                </a:rPr>
+                <a:t>ce  </a:t>
+              </a:r>
+              <a:r>
+                <a:rPr lang="en-US" sz="1600" b="0" spc="-5" dirty="0">
+                  <a:solidFill>
+                    <a:srgbClr val="001F5F"/>
+                  </a:solidFill>
+                  <a:latin typeface="Bahnschrift Light"/>
+                  <a:cs typeface="Bahnschrift Light"/>
+                </a:rPr>
+                <a:t>Institution 1</a:t>
+              </a:r>
+              <a:endParaRPr lang="en-US" sz="1600" dirty="0">
+                <a:latin typeface="Bahnschrift Light"/>
+                <a:cs typeface="Bahnschrift Light"/>
+              </a:endParaRPr>
+            </a:p>
+          </p:txBody>
+        </p:sp>
+        <p:sp>
+          <p:nvSpPr>
+            <p:cNvPr id="9" name="object 9"/>
+            <p:cNvSpPr/>
+            <p:nvPr/>
+          </p:nvSpPr>
+          <p:spPr>
+            <a:xfrm>
+              <a:off x="3067811" y="3799332"/>
+              <a:ext cx="1449705" cy="0"/>
+            </a:xfrm>
+            <a:custGeom>
+              <a:avLst/>
+              <a:gdLst/>
+              <a:ahLst/>
+              <a:cxnLst/>
+              <a:rect l="l" t="t" r="r" b="b"/>
+              <a:pathLst>
+                <a:path w="1449704">
+                  <a:moveTo>
+                    <a:pt x="0" y="0"/>
+                  </a:moveTo>
+                  <a:lnTo>
+                    <a:pt x="1449476" y="0"/>
+                  </a:lnTo>
+                </a:path>
+              </a:pathLst>
+            </a:custGeom>
+            <a:ln w="12700">
+              <a:solidFill>
+                <a:srgbClr val="001F5F"/>
+              </a:solidFill>
+            </a:ln>
+          </p:spPr>
+          <p:txBody>
+            <a:bodyPr wrap="square" lIns="0" tIns="0" rIns="0" bIns="0" rtlCol="0"/>
+            <a:lstStyle/>
+            <a:p>
+              <a:endParaRPr/>
+            </a:p>
+          </p:txBody>
+        </p:sp>
+        <p:sp>
+          <p:nvSpPr>
+            <p:cNvPr id="10" name="object 10"/>
+            <p:cNvSpPr/>
+            <p:nvPr/>
+          </p:nvSpPr>
+          <p:spPr>
+            <a:xfrm>
+              <a:off x="4504584" y="3761229"/>
+              <a:ext cx="76200" cy="76200"/>
+            </a:xfrm>
+            <a:custGeom>
+              <a:avLst/>
+              <a:gdLst/>
+              <a:ahLst/>
+              <a:cxnLst/>
+              <a:rect l="l" t="t" r="r" b="b"/>
+              <a:pathLst>
+                <a:path w="76200" h="76200">
+                  <a:moveTo>
+                    <a:pt x="0" y="0"/>
+                  </a:moveTo>
+                  <a:lnTo>
+                    <a:pt x="0" y="76199"/>
+                  </a:lnTo>
+                  <a:lnTo>
+                    <a:pt x="76200" y="38099"/>
+                  </a:lnTo>
+                  <a:lnTo>
+                    <a:pt x="0" y="0"/>
+                  </a:lnTo>
+                  <a:close/>
+                </a:path>
+              </a:pathLst>
+            </a:custGeom>
             <a:solidFill>
               <a:srgbClr val="001F5F"/>
             </a:solidFill>
-          </a:ln>
-        </p:spPr>
-        <p:txBody>
-          <a:bodyPr vert="horz" wrap="square" lIns="0" tIns="5715" rIns="0" bIns="0" rtlCol="0">
-            <a:spAutoFit/>
-          </a:bodyPr>
-          <a:lstStyle/>
-          <a:p>
-            <a:pPr>
-              <a:lnSpc>
-                <a:spcPct val="100000"/>
-              </a:lnSpc>
-              <a:spcBef>
-                <a:spcPts val="45"/>
-              </a:spcBef>
-            </a:pPr>
-            <a:endParaRPr sz="1650" dirty="0">
-              <a:latin typeface="Times New Roman"/>
-              <a:cs typeface="Times New Roman"/>
-            </a:endParaRPr>
-          </a:p>
-          <a:p>
-            <a:pPr marL="173990">
-              <a:lnSpc>
-                <a:spcPct val="100000"/>
-              </a:lnSpc>
-              <a:spcBef>
-                <a:spcPts val="5"/>
-              </a:spcBef>
-            </a:pPr>
-            <a:r>
-              <a:rPr sz="1600" b="0" spc="-10" dirty="0">
-                <a:solidFill>
-                  <a:srgbClr val="001F5F"/>
-                </a:solidFill>
-                <a:latin typeface="Bahnschrift Light"/>
-                <a:cs typeface="Bahnschrift Light"/>
-              </a:rPr>
-              <a:t>CLIENT/DEBTOR</a:t>
-            </a:r>
-            <a:endParaRPr sz="1600" dirty="0">
-              <a:latin typeface="Bahnschrift Light"/>
-              <a:cs typeface="Bahnschrift Light"/>
-            </a:endParaRPr>
-          </a:p>
-        </p:txBody>
-      </p:sp>
-      <p:sp>
-        <p:nvSpPr>
-          <p:cNvPr id="5" name="object 5"/>
-          <p:cNvSpPr/>
-          <p:nvPr/>
-        </p:nvSpPr>
-        <p:spPr>
-          <a:xfrm>
-            <a:off x="4581144" y="3029711"/>
-            <a:ext cx="3005455" cy="1537970"/>
-          </a:xfrm>
-          <a:custGeom>
-            <a:avLst/>
-            <a:gdLst/>
-            <a:ahLst/>
-            <a:cxnLst/>
-            <a:rect l="l" t="t" r="r" b="b"/>
-            <a:pathLst>
-              <a:path w="3005454" h="1537970">
-                <a:moveTo>
-                  <a:pt x="0" y="0"/>
-                </a:moveTo>
-                <a:lnTo>
-                  <a:pt x="3005328" y="0"/>
-                </a:lnTo>
-                <a:lnTo>
-                  <a:pt x="3005328" y="1537715"/>
-                </a:lnTo>
-                <a:lnTo>
-                  <a:pt x="0" y="1537715"/>
-                </a:lnTo>
-                <a:lnTo>
-                  <a:pt x="0" y="0"/>
-                </a:lnTo>
-                <a:close/>
-              </a:path>
-            </a:pathLst>
-          </a:custGeom>
-          <a:ln w="12700">
+          </p:spPr>
+          <p:txBody>
+            <a:bodyPr wrap="square" lIns="0" tIns="0" rIns="0" bIns="0" rtlCol="0"/>
+            <a:lstStyle/>
+            <a:p>
+              <a:endParaRPr/>
+            </a:p>
+          </p:txBody>
+        </p:sp>
+        <p:sp>
+          <p:nvSpPr>
+            <p:cNvPr id="13" name="object 13"/>
+            <p:cNvSpPr/>
+            <p:nvPr/>
+          </p:nvSpPr>
+          <p:spPr>
+            <a:xfrm>
+              <a:off x="2153408" y="2801113"/>
+              <a:ext cx="3930650" cy="563880"/>
+            </a:xfrm>
+            <a:custGeom>
+              <a:avLst/>
+              <a:gdLst/>
+              <a:ahLst/>
+              <a:cxnLst/>
+              <a:rect l="l" t="t" r="r" b="b"/>
+              <a:pathLst>
+                <a:path w="3930650" h="563879">
+                  <a:moveTo>
+                    <a:pt x="3930319" y="228600"/>
+                  </a:moveTo>
+                  <a:lnTo>
+                    <a:pt x="3930319" y="0"/>
+                  </a:lnTo>
+                  <a:lnTo>
+                    <a:pt x="0" y="0"/>
+                  </a:lnTo>
+                  <a:lnTo>
+                    <a:pt x="0" y="563816"/>
+                  </a:lnTo>
+                </a:path>
+              </a:pathLst>
+            </a:custGeom>
+            <a:ln w="12700">
+              <a:solidFill>
+                <a:srgbClr val="001F5F"/>
+              </a:solidFill>
+            </a:ln>
+          </p:spPr>
+          <p:txBody>
+            <a:bodyPr wrap="square" lIns="0" tIns="0" rIns="0" bIns="0" rtlCol="0"/>
+            <a:lstStyle/>
+            <a:p>
+              <a:endParaRPr/>
+            </a:p>
+          </p:txBody>
+        </p:sp>
+        <p:sp>
+          <p:nvSpPr>
+            <p:cNvPr id="14" name="object 14"/>
+            <p:cNvSpPr/>
+            <p:nvPr/>
+          </p:nvSpPr>
+          <p:spPr>
+            <a:xfrm>
+              <a:off x="2115314" y="3352236"/>
+              <a:ext cx="76200" cy="76200"/>
+            </a:xfrm>
+            <a:custGeom>
+              <a:avLst/>
+              <a:gdLst/>
+              <a:ahLst/>
+              <a:cxnLst/>
+              <a:rect l="l" t="t" r="r" b="b"/>
+              <a:pathLst>
+                <a:path w="76200" h="76200">
+                  <a:moveTo>
+                    <a:pt x="76200" y="0"/>
+                  </a:moveTo>
+                  <a:lnTo>
+                    <a:pt x="0" y="0"/>
+                  </a:lnTo>
+                  <a:lnTo>
+                    <a:pt x="38100" y="76200"/>
+                  </a:lnTo>
+                  <a:lnTo>
+                    <a:pt x="76200" y="0"/>
+                  </a:lnTo>
+                  <a:close/>
+                </a:path>
+              </a:pathLst>
+            </a:custGeom>
             <a:solidFill>
               <a:srgbClr val="001F5F"/>
             </a:solidFill>
-          </a:ln>
-        </p:spPr>
-        <p:txBody>
-          <a:bodyPr wrap="square" lIns="0" tIns="0" rIns="0" bIns="0" rtlCol="0"/>
-          <a:lstStyle/>
-          <a:p>
-            <a:endParaRPr/>
-          </a:p>
-        </p:txBody>
-      </p:sp>
-      <p:sp>
-        <p:nvSpPr>
-          <p:cNvPr id="6" name="object 6"/>
-          <p:cNvSpPr txBox="1"/>
-          <p:nvPr/>
-        </p:nvSpPr>
-        <p:spPr>
-          <a:xfrm>
-            <a:off x="4581144" y="3029711"/>
-            <a:ext cx="3005455" cy="1537970"/>
-          </a:xfrm>
-          <a:prstGeom prst="rect">
-            <a:avLst/>
-          </a:prstGeom>
-          <a:ln w="12700">
-            <a:solidFill>
-              <a:srgbClr val="001F5F"/>
-            </a:solidFill>
-          </a:ln>
-        </p:spPr>
-        <p:txBody>
-          <a:bodyPr vert="horz" wrap="square" lIns="0" tIns="5080" rIns="0" bIns="0" rtlCol="0">
-            <a:spAutoFit/>
-          </a:bodyPr>
-          <a:lstStyle/>
-          <a:p>
-            <a:pPr>
-              <a:lnSpc>
-                <a:spcPct val="100000"/>
-              </a:lnSpc>
-              <a:spcBef>
-                <a:spcPts val="40"/>
-              </a:spcBef>
-            </a:pPr>
-            <a:endParaRPr sz="2400" dirty="0">
-              <a:latin typeface="Times New Roman"/>
-              <a:cs typeface="Times New Roman"/>
-            </a:endParaRPr>
-          </a:p>
-          <a:p>
-            <a:pPr marL="310515" marR="303530" indent="-635" algn="ctr">
-              <a:lnSpc>
-                <a:spcPct val="100000"/>
-              </a:lnSpc>
-            </a:pPr>
-            <a:r>
-              <a:rPr sz="1800" b="0" spc="-5" dirty="0">
-                <a:solidFill>
-                  <a:srgbClr val="001F5F"/>
-                </a:solidFill>
-                <a:latin typeface="Bahnschrift Light"/>
-                <a:cs typeface="Bahnschrift Light"/>
-              </a:rPr>
-              <a:t>CENTRALIZED LOAN </a:t>
-            </a:r>
-            <a:r>
-              <a:rPr sz="1800" b="0" dirty="0">
-                <a:solidFill>
-                  <a:srgbClr val="001F5F"/>
-                </a:solidFill>
-                <a:latin typeface="Bahnschrift Light"/>
-                <a:cs typeface="Bahnschrift Light"/>
-              </a:rPr>
-              <a:t> </a:t>
-            </a:r>
-            <a:r>
-              <a:rPr sz="1800" b="0" spc="-5" dirty="0">
-                <a:solidFill>
-                  <a:srgbClr val="001F5F"/>
-                </a:solidFill>
-                <a:latin typeface="Bahnschrift Light"/>
-                <a:cs typeface="Bahnschrift Light"/>
-              </a:rPr>
-              <a:t>APPLICATION </a:t>
-            </a:r>
-            <a:r>
-              <a:rPr sz="1800" b="0" dirty="0">
-                <a:solidFill>
-                  <a:srgbClr val="001F5F"/>
-                </a:solidFill>
-                <a:latin typeface="Bahnschrift Light"/>
-                <a:cs typeface="Bahnschrift Light"/>
-              </a:rPr>
-              <a:t> </a:t>
-            </a:r>
-            <a:r>
-              <a:rPr sz="1800" b="0" spc="-5" dirty="0">
-                <a:solidFill>
-                  <a:srgbClr val="001F5F"/>
-                </a:solidFill>
-                <a:latin typeface="Bahnschrift Light"/>
-                <a:cs typeface="Bahnschrift Light"/>
-              </a:rPr>
-              <a:t>MANAGEMENT</a:t>
-            </a:r>
-            <a:r>
-              <a:rPr sz="1800" b="0" spc="-80" dirty="0">
-                <a:solidFill>
-                  <a:srgbClr val="001F5F"/>
-                </a:solidFill>
-                <a:latin typeface="Bahnschrift Light"/>
-                <a:cs typeface="Bahnschrift Light"/>
-              </a:rPr>
-              <a:t> </a:t>
-            </a:r>
-            <a:r>
-              <a:rPr sz="1800" b="0" spc="-5" dirty="0">
-                <a:solidFill>
-                  <a:srgbClr val="001F5F"/>
-                </a:solidFill>
-                <a:latin typeface="Bahnschrift Light"/>
-                <a:cs typeface="Bahnschrift Light"/>
-              </a:rPr>
-              <a:t>SYSTEM</a:t>
-            </a:r>
-            <a:endParaRPr sz="1800" dirty="0">
-              <a:latin typeface="Bahnschrift Light"/>
-              <a:cs typeface="Bahnschrift Light"/>
-            </a:endParaRPr>
-          </a:p>
-        </p:txBody>
-      </p:sp>
-      <p:sp>
-        <p:nvSpPr>
-          <p:cNvPr id="7" name="object 7"/>
-          <p:cNvSpPr txBox="1"/>
-          <p:nvPr/>
-        </p:nvSpPr>
-        <p:spPr>
-          <a:xfrm>
-            <a:off x="8763000" y="2743200"/>
-            <a:ext cx="2863596" cy="340478"/>
-          </a:xfrm>
-          <a:prstGeom prst="rect">
-            <a:avLst/>
-          </a:prstGeom>
-          <a:ln w="12700">
-            <a:solidFill>
-              <a:srgbClr val="001F5F"/>
-            </a:solidFill>
-          </a:ln>
-        </p:spPr>
-        <p:txBody>
-          <a:bodyPr vert="horz" wrap="square" lIns="0" tIns="93345" rIns="0" bIns="0" rtlCol="0">
-            <a:spAutoFit/>
-          </a:bodyPr>
-          <a:lstStyle/>
-          <a:p>
-            <a:pPr marL="276225" marR="98425" indent="-170815">
-              <a:lnSpc>
-                <a:spcPct val="100000"/>
-              </a:lnSpc>
-              <a:spcBef>
-                <a:spcPts val="735"/>
-              </a:spcBef>
-            </a:pPr>
-            <a:r>
-              <a:rPr lang="en-US" sz="1600" b="0" dirty="0">
-                <a:solidFill>
-                  <a:srgbClr val="001F5F"/>
-                </a:solidFill>
-                <a:latin typeface="Bahnschrift Light"/>
-                <a:cs typeface="Bahnschrift Light"/>
-              </a:rPr>
-              <a:t>M</a:t>
-            </a:r>
-            <a:r>
-              <a:rPr lang="en-US" sz="1600" b="0" spc="-5" dirty="0">
-                <a:solidFill>
-                  <a:srgbClr val="001F5F"/>
-                </a:solidFill>
-                <a:latin typeface="Bahnschrift Light"/>
-                <a:cs typeface="Bahnschrift Light"/>
-              </a:rPr>
-              <a:t>i</a:t>
-            </a:r>
-            <a:r>
-              <a:rPr lang="en-US" sz="1600" b="0" dirty="0">
-                <a:solidFill>
-                  <a:srgbClr val="001F5F"/>
-                </a:solidFill>
-                <a:latin typeface="Bahnschrift Light"/>
-                <a:cs typeface="Bahnschrift Light"/>
-              </a:rPr>
-              <a:t>crof</a:t>
-            </a:r>
-            <a:r>
-              <a:rPr lang="en-US" sz="1600" b="0" spc="-5" dirty="0">
-                <a:solidFill>
-                  <a:srgbClr val="001F5F"/>
-                </a:solidFill>
-                <a:latin typeface="Bahnschrift Light"/>
-                <a:cs typeface="Bahnschrift Light"/>
-              </a:rPr>
-              <a:t>inan</a:t>
-            </a:r>
-            <a:r>
-              <a:rPr lang="en-US" sz="1600" b="0" dirty="0">
-                <a:solidFill>
-                  <a:srgbClr val="001F5F"/>
-                </a:solidFill>
-                <a:latin typeface="Bahnschrift Light"/>
-                <a:cs typeface="Bahnschrift Light"/>
-              </a:rPr>
-              <a:t>ce  </a:t>
-            </a:r>
-            <a:r>
-              <a:rPr lang="en-US" sz="1600" b="0" spc="-5" dirty="0">
-                <a:solidFill>
-                  <a:srgbClr val="001F5F"/>
-                </a:solidFill>
-                <a:latin typeface="Bahnschrift Light"/>
-                <a:cs typeface="Bahnschrift Light"/>
-              </a:rPr>
-              <a:t>Institution 1</a:t>
-            </a:r>
-            <a:endParaRPr lang="en-US" sz="1600" dirty="0">
-              <a:latin typeface="Bahnschrift Light"/>
-              <a:cs typeface="Bahnschrift Light"/>
-            </a:endParaRPr>
-          </a:p>
-        </p:txBody>
-      </p:sp>
-      <p:sp>
-        <p:nvSpPr>
-          <p:cNvPr id="9" name="object 9"/>
-          <p:cNvSpPr/>
-          <p:nvPr/>
-        </p:nvSpPr>
-        <p:spPr>
-          <a:xfrm>
-            <a:off x="3067811" y="3799332"/>
-            <a:ext cx="1449705" cy="0"/>
-          </a:xfrm>
-          <a:custGeom>
-            <a:avLst/>
-            <a:gdLst/>
-            <a:ahLst/>
-            <a:cxnLst/>
-            <a:rect l="l" t="t" r="r" b="b"/>
-            <a:pathLst>
-              <a:path w="1449704">
-                <a:moveTo>
-                  <a:pt x="0" y="0"/>
-                </a:moveTo>
-                <a:lnTo>
-                  <a:pt x="1449476" y="0"/>
-                </a:lnTo>
-              </a:path>
-            </a:pathLst>
-          </a:custGeom>
-          <a:ln w="12700">
-            <a:solidFill>
-              <a:srgbClr val="001F5F"/>
-            </a:solidFill>
-          </a:ln>
-        </p:spPr>
-        <p:txBody>
-          <a:bodyPr wrap="square" lIns="0" tIns="0" rIns="0" bIns="0" rtlCol="0"/>
-          <a:lstStyle/>
-          <a:p>
-            <a:endParaRPr/>
-          </a:p>
-        </p:txBody>
-      </p:sp>
-      <p:sp>
-        <p:nvSpPr>
-          <p:cNvPr id="10" name="object 10"/>
-          <p:cNvSpPr/>
-          <p:nvPr/>
-        </p:nvSpPr>
-        <p:spPr>
-          <a:xfrm>
-            <a:off x="4504584" y="3761229"/>
-            <a:ext cx="76200" cy="76200"/>
-          </a:xfrm>
-          <a:custGeom>
-            <a:avLst/>
-            <a:gdLst/>
-            <a:ahLst/>
-            <a:cxnLst/>
-            <a:rect l="l" t="t" r="r" b="b"/>
-            <a:pathLst>
-              <a:path w="76200" h="76200">
-                <a:moveTo>
-                  <a:pt x="0" y="0"/>
-                </a:moveTo>
-                <a:lnTo>
-                  <a:pt x="0" y="76199"/>
-                </a:lnTo>
-                <a:lnTo>
-                  <a:pt x="76200" y="38099"/>
-                </a:lnTo>
-                <a:lnTo>
-                  <a:pt x="0" y="0"/>
-                </a:lnTo>
-                <a:close/>
-              </a:path>
-            </a:pathLst>
-          </a:custGeom>
-          <a:solidFill>
-            <a:srgbClr val="001F5F"/>
-          </a:solidFill>
-        </p:spPr>
-        <p:txBody>
-          <a:bodyPr wrap="square" lIns="0" tIns="0" rIns="0" bIns="0" rtlCol="0"/>
-          <a:lstStyle/>
-          <a:p>
-            <a:endParaRPr/>
-          </a:p>
-        </p:txBody>
-      </p:sp>
-      <p:sp>
-        <p:nvSpPr>
-          <p:cNvPr id="13" name="object 13"/>
-          <p:cNvSpPr/>
-          <p:nvPr/>
-        </p:nvSpPr>
-        <p:spPr>
-          <a:xfrm>
-            <a:off x="2153408" y="2801113"/>
-            <a:ext cx="3930650" cy="563880"/>
-          </a:xfrm>
-          <a:custGeom>
-            <a:avLst/>
-            <a:gdLst/>
-            <a:ahLst/>
-            <a:cxnLst/>
-            <a:rect l="l" t="t" r="r" b="b"/>
-            <a:pathLst>
-              <a:path w="3930650" h="563879">
-                <a:moveTo>
-                  <a:pt x="3930319" y="228600"/>
-                </a:moveTo>
-                <a:lnTo>
-                  <a:pt x="3930319" y="0"/>
-                </a:lnTo>
-                <a:lnTo>
-                  <a:pt x="0" y="0"/>
-                </a:lnTo>
-                <a:lnTo>
-                  <a:pt x="0" y="563816"/>
-                </a:lnTo>
-              </a:path>
-            </a:pathLst>
-          </a:custGeom>
-          <a:ln w="12700">
-            <a:solidFill>
-              <a:srgbClr val="001F5F"/>
-            </a:solidFill>
-          </a:ln>
-        </p:spPr>
-        <p:txBody>
-          <a:bodyPr wrap="square" lIns="0" tIns="0" rIns="0" bIns="0" rtlCol="0"/>
-          <a:lstStyle/>
-          <a:p>
-            <a:endParaRPr/>
-          </a:p>
-        </p:txBody>
-      </p:sp>
-      <p:sp>
-        <p:nvSpPr>
-          <p:cNvPr id="14" name="object 14"/>
-          <p:cNvSpPr/>
-          <p:nvPr/>
-        </p:nvSpPr>
-        <p:spPr>
-          <a:xfrm>
-            <a:off x="2115314" y="3352236"/>
-            <a:ext cx="76200" cy="76200"/>
-          </a:xfrm>
-          <a:custGeom>
-            <a:avLst/>
-            <a:gdLst/>
-            <a:ahLst/>
-            <a:cxnLst/>
-            <a:rect l="l" t="t" r="r" b="b"/>
-            <a:pathLst>
-              <a:path w="76200" h="76200">
-                <a:moveTo>
-                  <a:pt x="76200" y="0"/>
-                </a:moveTo>
-                <a:lnTo>
-                  <a:pt x="0" y="0"/>
-                </a:lnTo>
-                <a:lnTo>
-                  <a:pt x="38100" y="76200"/>
-                </a:lnTo>
-                <a:lnTo>
-                  <a:pt x="76200" y="0"/>
-                </a:lnTo>
-                <a:close/>
-              </a:path>
-            </a:pathLst>
-          </a:custGeom>
-          <a:solidFill>
-            <a:srgbClr val="001F5F"/>
-          </a:solidFill>
-        </p:spPr>
-        <p:txBody>
-          <a:bodyPr wrap="square" lIns="0" tIns="0" rIns="0" bIns="0" rtlCol="0"/>
-          <a:lstStyle/>
-          <a:p>
-            <a:endParaRPr/>
-          </a:p>
-        </p:txBody>
-      </p:sp>
-      <p:sp>
-        <p:nvSpPr>
-          <p:cNvPr id="17" name="object 7">
-            <a:extLst>
-              <a:ext uri="{FF2B5EF4-FFF2-40B4-BE49-F238E27FC236}">
-                <a16:creationId xmlns:a16="http://schemas.microsoft.com/office/drawing/2014/main" id="{AE1067BC-0861-B5BE-C7E5-7A7176AFEBBD}"/>
-              </a:ext>
-            </a:extLst>
-          </p:cNvPr>
-          <p:cNvSpPr txBox="1"/>
-          <p:nvPr/>
-        </p:nvSpPr>
-        <p:spPr>
-          <a:xfrm>
-            <a:off x="8763000" y="3370523"/>
-            <a:ext cx="2863596" cy="340478"/>
-          </a:xfrm>
-          <a:prstGeom prst="rect">
-            <a:avLst/>
-          </a:prstGeom>
-          <a:ln w="12700">
-            <a:solidFill>
-              <a:srgbClr val="001F5F"/>
-            </a:solidFill>
-          </a:ln>
-        </p:spPr>
-        <p:txBody>
-          <a:bodyPr vert="horz" wrap="square" lIns="0" tIns="93345" rIns="0" bIns="0" rtlCol="0">
-            <a:spAutoFit/>
-          </a:bodyPr>
-          <a:lstStyle/>
-          <a:p>
-            <a:pPr marL="276225" marR="98425" indent="-170815">
-              <a:lnSpc>
-                <a:spcPct val="100000"/>
-              </a:lnSpc>
-              <a:spcBef>
-                <a:spcPts val="735"/>
-              </a:spcBef>
-            </a:pPr>
-            <a:r>
-              <a:rPr lang="en-US" sz="1600" b="0" dirty="0">
-                <a:solidFill>
-                  <a:srgbClr val="001F5F"/>
-                </a:solidFill>
-                <a:latin typeface="Bahnschrift Light"/>
-                <a:cs typeface="Bahnschrift Light"/>
-              </a:rPr>
-              <a:t>M</a:t>
-            </a:r>
-            <a:r>
-              <a:rPr lang="en-US" sz="1600" b="0" spc="-5" dirty="0">
-                <a:solidFill>
-                  <a:srgbClr val="001F5F"/>
-                </a:solidFill>
-                <a:latin typeface="Bahnschrift Light"/>
-                <a:cs typeface="Bahnschrift Light"/>
-              </a:rPr>
-              <a:t>i</a:t>
-            </a:r>
-            <a:r>
-              <a:rPr lang="en-US" sz="1600" b="0" dirty="0">
-                <a:solidFill>
-                  <a:srgbClr val="001F5F"/>
-                </a:solidFill>
-                <a:latin typeface="Bahnschrift Light"/>
-                <a:cs typeface="Bahnschrift Light"/>
-              </a:rPr>
-              <a:t>crof</a:t>
-            </a:r>
-            <a:r>
-              <a:rPr lang="en-US" sz="1600" b="0" spc="-5" dirty="0">
-                <a:solidFill>
-                  <a:srgbClr val="001F5F"/>
-                </a:solidFill>
-                <a:latin typeface="Bahnschrift Light"/>
-                <a:cs typeface="Bahnschrift Light"/>
-              </a:rPr>
-              <a:t>inan</a:t>
-            </a:r>
-            <a:r>
-              <a:rPr lang="en-US" sz="1600" b="0" dirty="0">
-                <a:solidFill>
-                  <a:srgbClr val="001F5F"/>
-                </a:solidFill>
-                <a:latin typeface="Bahnschrift Light"/>
-                <a:cs typeface="Bahnschrift Light"/>
-              </a:rPr>
-              <a:t>ce  </a:t>
-            </a:r>
-            <a:r>
-              <a:rPr lang="en-US" sz="1600" b="0" spc="-5" dirty="0">
-                <a:solidFill>
-                  <a:srgbClr val="001F5F"/>
-                </a:solidFill>
-                <a:latin typeface="Bahnschrift Light"/>
-                <a:cs typeface="Bahnschrift Light"/>
-              </a:rPr>
-              <a:t>Institution ..</a:t>
-            </a:r>
-            <a:endParaRPr lang="en-US" sz="1600" dirty="0">
-              <a:latin typeface="Bahnschrift Light"/>
-              <a:cs typeface="Bahnschrift Light"/>
-            </a:endParaRPr>
-          </a:p>
-        </p:txBody>
-      </p:sp>
-      <p:sp>
-        <p:nvSpPr>
-          <p:cNvPr id="18" name="object 7">
-            <a:extLst>
-              <a:ext uri="{FF2B5EF4-FFF2-40B4-BE49-F238E27FC236}">
-                <a16:creationId xmlns:a16="http://schemas.microsoft.com/office/drawing/2014/main" id="{12C5A14D-32CF-6079-E6EB-92E54AE9DE05}"/>
-              </a:ext>
-            </a:extLst>
-          </p:cNvPr>
-          <p:cNvSpPr txBox="1"/>
-          <p:nvPr/>
-        </p:nvSpPr>
-        <p:spPr>
-          <a:xfrm>
-            <a:off x="8763000" y="3965143"/>
-            <a:ext cx="2863596" cy="340478"/>
-          </a:xfrm>
-          <a:prstGeom prst="rect">
-            <a:avLst/>
-          </a:prstGeom>
-          <a:ln w="12700">
-            <a:solidFill>
-              <a:srgbClr val="001F5F"/>
-            </a:solidFill>
-          </a:ln>
-        </p:spPr>
-        <p:txBody>
-          <a:bodyPr vert="horz" wrap="square" lIns="0" tIns="93345" rIns="0" bIns="0" rtlCol="0">
-            <a:spAutoFit/>
-          </a:bodyPr>
-          <a:lstStyle/>
-          <a:p>
-            <a:pPr marL="276225" marR="98425" indent="-170815">
-              <a:lnSpc>
-                <a:spcPct val="100000"/>
-              </a:lnSpc>
-              <a:spcBef>
-                <a:spcPts val="735"/>
-              </a:spcBef>
-            </a:pPr>
-            <a:r>
-              <a:rPr lang="en-US" sz="1600" b="0" dirty="0">
-                <a:solidFill>
-                  <a:srgbClr val="001F5F"/>
-                </a:solidFill>
-                <a:latin typeface="Bahnschrift Light"/>
-                <a:cs typeface="Bahnschrift Light"/>
-              </a:rPr>
-              <a:t>M</a:t>
-            </a:r>
-            <a:r>
-              <a:rPr lang="en-US" sz="1600" b="0" spc="-5" dirty="0">
-                <a:solidFill>
-                  <a:srgbClr val="001F5F"/>
-                </a:solidFill>
-                <a:latin typeface="Bahnschrift Light"/>
-                <a:cs typeface="Bahnschrift Light"/>
-              </a:rPr>
-              <a:t>i</a:t>
-            </a:r>
-            <a:r>
-              <a:rPr lang="en-US" sz="1600" b="0" dirty="0">
-                <a:solidFill>
-                  <a:srgbClr val="001F5F"/>
-                </a:solidFill>
-                <a:latin typeface="Bahnschrift Light"/>
-                <a:cs typeface="Bahnschrift Light"/>
-              </a:rPr>
-              <a:t>crof</a:t>
-            </a:r>
-            <a:r>
-              <a:rPr lang="en-US" sz="1600" b="0" spc="-5" dirty="0">
-                <a:solidFill>
-                  <a:srgbClr val="001F5F"/>
-                </a:solidFill>
-                <a:latin typeface="Bahnschrift Light"/>
-                <a:cs typeface="Bahnschrift Light"/>
-              </a:rPr>
-              <a:t>inan</a:t>
-            </a:r>
-            <a:r>
-              <a:rPr lang="en-US" sz="1600" b="0" dirty="0">
-                <a:solidFill>
-                  <a:srgbClr val="001F5F"/>
-                </a:solidFill>
-                <a:latin typeface="Bahnschrift Light"/>
-                <a:cs typeface="Bahnschrift Light"/>
-              </a:rPr>
-              <a:t>ce  </a:t>
-            </a:r>
-            <a:r>
-              <a:rPr lang="en-US" sz="1600" b="0" spc="-5" dirty="0">
-                <a:solidFill>
-                  <a:srgbClr val="001F5F"/>
-                </a:solidFill>
-                <a:latin typeface="Bahnschrift Light"/>
-                <a:cs typeface="Bahnschrift Light"/>
-              </a:rPr>
-              <a:t>Institution ..</a:t>
-            </a:r>
-            <a:endParaRPr lang="en-US" sz="1600" dirty="0">
-              <a:latin typeface="Bahnschrift Light"/>
-              <a:cs typeface="Bahnschrift Light"/>
-            </a:endParaRPr>
-          </a:p>
-        </p:txBody>
-      </p:sp>
-      <p:sp>
-        <p:nvSpPr>
-          <p:cNvPr id="19" name="object 7">
-            <a:extLst>
-              <a:ext uri="{FF2B5EF4-FFF2-40B4-BE49-F238E27FC236}">
-                <a16:creationId xmlns:a16="http://schemas.microsoft.com/office/drawing/2014/main" id="{700ACE08-889B-4E5E-E445-55CCF69C7DB2}"/>
-              </a:ext>
-            </a:extLst>
-          </p:cNvPr>
-          <p:cNvSpPr txBox="1"/>
-          <p:nvPr/>
-        </p:nvSpPr>
-        <p:spPr>
-          <a:xfrm>
-            <a:off x="8763000" y="4559763"/>
-            <a:ext cx="2863596" cy="340478"/>
-          </a:xfrm>
-          <a:prstGeom prst="rect">
-            <a:avLst/>
-          </a:prstGeom>
-          <a:ln w="12700">
-            <a:solidFill>
-              <a:srgbClr val="001F5F"/>
-            </a:solidFill>
-          </a:ln>
-        </p:spPr>
-        <p:txBody>
-          <a:bodyPr vert="horz" wrap="square" lIns="0" tIns="93345" rIns="0" bIns="0" rtlCol="0">
-            <a:spAutoFit/>
-          </a:bodyPr>
-          <a:lstStyle/>
-          <a:p>
-            <a:pPr marL="276225" marR="98425" indent="-170815">
-              <a:lnSpc>
-                <a:spcPct val="100000"/>
-              </a:lnSpc>
-              <a:spcBef>
-                <a:spcPts val="735"/>
-              </a:spcBef>
-            </a:pPr>
-            <a:r>
-              <a:rPr lang="en-US" sz="1600" b="0" dirty="0">
-                <a:solidFill>
-                  <a:srgbClr val="001F5F"/>
-                </a:solidFill>
-                <a:latin typeface="Bahnschrift Light"/>
-                <a:cs typeface="Bahnschrift Light"/>
-              </a:rPr>
-              <a:t>M</a:t>
-            </a:r>
-            <a:r>
-              <a:rPr lang="en-US" sz="1600" b="0" spc="-5" dirty="0">
-                <a:solidFill>
-                  <a:srgbClr val="001F5F"/>
-                </a:solidFill>
-                <a:latin typeface="Bahnschrift Light"/>
-                <a:cs typeface="Bahnschrift Light"/>
-              </a:rPr>
-              <a:t>i</a:t>
-            </a:r>
-            <a:r>
-              <a:rPr lang="en-US" sz="1600" b="0" dirty="0">
-                <a:solidFill>
-                  <a:srgbClr val="001F5F"/>
-                </a:solidFill>
-                <a:latin typeface="Bahnschrift Light"/>
-                <a:cs typeface="Bahnschrift Light"/>
-              </a:rPr>
-              <a:t>crof</a:t>
-            </a:r>
-            <a:r>
-              <a:rPr lang="en-US" sz="1600" b="0" spc="-5" dirty="0">
-                <a:solidFill>
-                  <a:srgbClr val="001F5F"/>
-                </a:solidFill>
-                <a:latin typeface="Bahnschrift Light"/>
-                <a:cs typeface="Bahnschrift Light"/>
-              </a:rPr>
-              <a:t>inan</a:t>
-            </a:r>
-            <a:r>
-              <a:rPr lang="en-US" sz="1600" b="0" dirty="0">
-                <a:solidFill>
-                  <a:srgbClr val="001F5F"/>
-                </a:solidFill>
-                <a:latin typeface="Bahnschrift Light"/>
-                <a:cs typeface="Bahnschrift Light"/>
-              </a:rPr>
-              <a:t>ce  </a:t>
-            </a:r>
-            <a:r>
-              <a:rPr lang="en-US" sz="1600" b="0" spc="-5" dirty="0">
-                <a:solidFill>
-                  <a:srgbClr val="001F5F"/>
-                </a:solidFill>
-                <a:latin typeface="Bahnschrift Light"/>
-                <a:cs typeface="Bahnschrift Light"/>
-              </a:rPr>
-              <a:t>Institution ..n</a:t>
-            </a:r>
-            <a:endParaRPr lang="en-US" sz="1600" dirty="0">
-              <a:latin typeface="Bahnschrift Light"/>
-              <a:cs typeface="Bahnschrift Light"/>
-            </a:endParaRPr>
-          </a:p>
-        </p:txBody>
-      </p:sp>
-      <p:cxnSp>
-        <p:nvCxnSpPr>
-          <p:cNvPr id="21" name="Connector: Elbow 20">
-            <a:extLst>
-              <a:ext uri="{FF2B5EF4-FFF2-40B4-BE49-F238E27FC236}">
-                <a16:creationId xmlns:a16="http://schemas.microsoft.com/office/drawing/2014/main" id="{AA8DA5DD-D0D2-E68C-B3DE-A171B7B25F83}"/>
-              </a:ext>
-            </a:extLst>
-          </p:cNvPr>
-          <p:cNvCxnSpPr>
-            <a:stCxn id="7" idx="1"/>
-            <a:endCxn id="19" idx="1"/>
-          </p:cNvCxnSpPr>
-          <p:nvPr/>
-        </p:nvCxnSpPr>
-        <p:spPr>
-          <a:xfrm rot="10800000" flipV="1">
-            <a:off x="8763000" y="2913438"/>
-            <a:ext cx="12700" cy="1816563"/>
-          </a:xfrm>
-          <a:prstGeom prst="bentConnector3">
-            <a:avLst>
-              <a:gd name="adj1" fmla="val 1800000"/>
-            </a:avLst>
-          </a:prstGeom>
-          <a:ln>
-            <a:solidFill>
-              <a:srgbClr val="002060"/>
-            </a:solidFill>
-          </a:ln>
-        </p:spPr>
-        <p:style>
-          <a:lnRef idx="1">
-            <a:schemeClr val="accent1"/>
-          </a:lnRef>
-          <a:fillRef idx="0">
-            <a:schemeClr val="accent1"/>
-          </a:fillRef>
-          <a:effectRef idx="0">
-            <a:schemeClr val="accent1"/>
-          </a:effectRef>
-          <a:fontRef idx="minor">
-            <a:schemeClr val="tx1"/>
-          </a:fontRef>
-        </p:style>
-      </p:cxnSp>
-      <p:cxnSp>
-        <p:nvCxnSpPr>
-          <p:cNvPr id="27" name="Straight Arrow Connector 26">
-            <a:extLst>
-              <a:ext uri="{FF2B5EF4-FFF2-40B4-BE49-F238E27FC236}">
-                <a16:creationId xmlns:a16="http://schemas.microsoft.com/office/drawing/2014/main" id="{94B9E28E-B302-E2EB-4DE5-AAAC71F4B68B}"/>
-              </a:ext>
-            </a:extLst>
-          </p:cNvPr>
-          <p:cNvCxnSpPr>
-            <a:cxnSpLocks/>
-          </p:cNvCxnSpPr>
-          <p:nvPr/>
-        </p:nvCxnSpPr>
-        <p:spPr>
-          <a:xfrm flipH="1">
-            <a:off x="7586599" y="3624994"/>
-            <a:ext cx="968724" cy="0"/>
-          </a:xfrm>
-          <a:prstGeom prst="straightConnector1">
-            <a:avLst/>
-          </a:prstGeom>
-          <a:ln>
-            <a:solidFill>
-              <a:srgbClr val="002060"/>
-            </a:solidFill>
-            <a:tailEnd type="triangle"/>
-          </a:ln>
-        </p:spPr>
-        <p:style>
-          <a:lnRef idx="1">
-            <a:schemeClr val="accent1"/>
-          </a:lnRef>
-          <a:fillRef idx="0">
-            <a:schemeClr val="accent1"/>
-          </a:fillRef>
-          <a:effectRef idx="0">
-            <a:schemeClr val="accent1"/>
-          </a:effectRef>
-          <a:fontRef idx="minor">
-            <a:schemeClr val="tx1"/>
-          </a:fontRef>
-        </p:style>
-      </p:cxnSp>
-      <p:cxnSp>
-        <p:nvCxnSpPr>
-          <p:cNvPr id="32" name="Straight Connector 31">
-            <a:extLst>
-              <a:ext uri="{FF2B5EF4-FFF2-40B4-BE49-F238E27FC236}">
-                <a16:creationId xmlns:a16="http://schemas.microsoft.com/office/drawing/2014/main" id="{5D20EFF9-14CC-13A9-93A0-0D364C8AA6F7}"/>
-              </a:ext>
-            </a:extLst>
-          </p:cNvPr>
-          <p:cNvCxnSpPr>
-            <a:cxnSpLocks/>
-            <a:stCxn id="17" idx="1"/>
-          </p:cNvCxnSpPr>
-          <p:nvPr/>
-        </p:nvCxnSpPr>
-        <p:spPr>
-          <a:xfrm flipH="1">
-            <a:off x="8555323" y="3540762"/>
-            <a:ext cx="207677" cy="0"/>
-          </a:xfrm>
-          <a:prstGeom prst="line">
-            <a:avLst/>
-          </a:prstGeom>
-          <a:ln>
-            <a:solidFill>
-              <a:srgbClr val="002060"/>
-            </a:solidFill>
-          </a:ln>
-        </p:spPr>
-        <p:style>
-          <a:lnRef idx="1">
-            <a:schemeClr val="accent1"/>
-          </a:lnRef>
-          <a:fillRef idx="0">
-            <a:schemeClr val="accent1"/>
-          </a:fillRef>
-          <a:effectRef idx="0">
-            <a:schemeClr val="accent1"/>
-          </a:effectRef>
-          <a:fontRef idx="minor">
-            <a:schemeClr val="tx1"/>
-          </a:fontRef>
-        </p:style>
-      </p:cxnSp>
-      <p:cxnSp>
-        <p:nvCxnSpPr>
-          <p:cNvPr id="34" name="Straight Connector 33">
-            <a:extLst>
-              <a:ext uri="{FF2B5EF4-FFF2-40B4-BE49-F238E27FC236}">
-                <a16:creationId xmlns:a16="http://schemas.microsoft.com/office/drawing/2014/main" id="{5C948921-0CFF-6FB7-254B-10DFD24BCFC8}"/>
-              </a:ext>
-            </a:extLst>
-          </p:cNvPr>
-          <p:cNvCxnSpPr>
-            <a:cxnSpLocks/>
-            <a:stCxn id="18" idx="1"/>
-          </p:cNvCxnSpPr>
-          <p:nvPr/>
-        </p:nvCxnSpPr>
-        <p:spPr>
-          <a:xfrm flipH="1">
-            <a:off x="8555323" y="4135382"/>
-            <a:ext cx="207677" cy="0"/>
-          </a:xfrm>
-          <a:prstGeom prst="line">
-            <a:avLst/>
-          </a:prstGeom>
-          <a:ln>
-            <a:solidFill>
-              <a:srgbClr val="002060"/>
-            </a:solidFill>
-          </a:ln>
-        </p:spPr>
-        <p:style>
-          <a:lnRef idx="1">
-            <a:schemeClr val="accent1"/>
-          </a:lnRef>
-          <a:fillRef idx="0">
-            <a:schemeClr val="accent1"/>
-          </a:fillRef>
-          <a:effectRef idx="0">
-            <a:schemeClr val="accent1"/>
-          </a:effectRef>
-          <a:fontRef idx="minor">
-            <a:schemeClr val="tx1"/>
-          </a:fontRef>
-        </p:style>
-      </p:cxnSp>
-      <p:cxnSp>
-        <p:nvCxnSpPr>
-          <p:cNvPr id="37" name="Straight Arrow Connector 36">
-            <a:extLst>
-              <a:ext uri="{FF2B5EF4-FFF2-40B4-BE49-F238E27FC236}">
-                <a16:creationId xmlns:a16="http://schemas.microsoft.com/office/drawing/2014/main" id="{57E87BB6-2738-788D-A881-D1E023E35EA3}"/>
-              </a:ext>
-            </a:extLst>
-          </p:cNvPr>
-          <p:cNvCxnSpPr>
-            <a:cxnSpLocks/>
-          </p:cNvCxnSpPr>
-          <p:nvPr/>
-        </p:nvCxnSpPr>
-        <p:spPr>
-          <a:xfrm>
-            <a:off x="7586599" y="3962400"/>
-            <a:ext cx="968724" cy="0"/>
-          </a:xfrm>
-          <a:prstGeom prst="straightConnector1">
-            <a:avLst/>
-          </a:prstGeom>
-          <a:ln>
-            <a:solidFill>
-              <a:srgbClr val="002060"/>
-            </a:solidFill>
-            <a:tailEnd type="triangle"/>
-          </a:ln>
-        </p:spPr>
-        <p:style>
-          <a:lnRef idx="1">
-            <a:schemeClr val="accent1"/>
-          </a:lnRef>
-          <a:fillRef idx="0">
-            <a:schemeClr val="accent1"/>
-          </a:fillRef>
-          <a:effectRef idx="0">
-            <a:schemeClr val="accent1"/>
-          </a:effectRef>
-          <a:fontRef idx="minor">
-            <a:schemeClr val="tx1"/>
-          </a:fontRef>
-        </p:style>
-      </p:cxnSp>
-      <p:sp>
-        <p:nvSpPr>
-          <p:cNvPr id="8" name="object 4">
-            <a:extLst>
-              <a:ext uri="{FF2B5EF4-FFF2-40B4-BE49-F238E27FC236}">
-                <a16:creationId xmlns:a16="http://schemas.microsoft.com/office/drawing/2014/main" id="{E33D91DB-63D6-A074-A349-ADEDFEF258CE}"/>
-              </a:ext>
-            </a:extLst>
-          </p:cNvPr>
-          <p:cNvSpPr txBox="1"/>
-          <p:nvPr/>
-        </p:nvSpPr>
-        <p:spPr>
-          <a:xfrm>
-            <a:off x="5169471" y="5287656"/>
-            <a:ext cx="1828800" cy="744435"/>
-          </a:xfrm>
-          <a:prstGeom prst="rect">
-            <a:avLst/>
-          </a:prstGeom>
-          <a:ln w="12700">
-            <a:solidFill>
-              <a:srgbClr val="001F5F"/>
-            </a:solidFill>
-          </a:ln>
-        </p:spPr>
-        <p:txBody>
-          <a:bodyPr vert="horz" wrap="square" lIns="0" tIns="5715" rIns="0" bIns="0" rtlCol="0">
-            <a:spAutoFit/>
-          </a:bodyPr>
-          <a:lstStyle/>
-          <a:p>
-            <a:pPr marL="173990" algn="ctr">
-              <a:lnSpc>
-                <a:spcPct val="100000"/>
-              </a:lnSpc>
-              <a:spcBef>
-                <a:spcPts val="5"/>
-              </a:spcBef>
-            </a:pPr>
-            <a:endParaRPr lang="en-US" sz="1600" spc="-10" dirty="0">
+          </p:spPr>
+          <p:txBody>
+            <a:bodyPr wrap="square" lIns="0" tIns="0" rIns="0" bIns="0" rtlCol="0"/>
+            <a:lstStyle/>
+            <a:p>
+              <a:endParaRPr/>
+            </a:p>
+          </p:txBody>
+        </p:sp>
+        <p:sp>
+          <p:nvSpPr>
+            <p:cNvPr id="17" name="object 7">
+              <a:extLst>
+                <a:ext uri="{FF2B5EF4-FFF2-40B4-BE49-F238E27FC236}">
+                  <a16:creationId xmlns:a16="http://schemas.microsoft.com/office/drawing/2014/main" id="{AE1067BC-0861-B5BE-C7E5-7A7176AFEBBD}"/>
+                </a:ext>
+              </a:extLst>
+            </p:cNvPr>
+            <p:cNvSpPr txBox="1"/>
+            <p:nvPr/>
+          </p:nvSpPr>
+          <p:spPr>
+            <a:xfrm>
+              <a:off x="8763000" y="3370523"/>
+              <a:ext cx="2863596" cy="340478"/>
+            </a:xfrm>
+            <a:prstGeom prst="rect">
+              <a:avLst/>
+            </a:prstGeom>
+            <a:ln w="12700">
               <a:solidFill>
                 <a:srgbClr val="001F5F"/>
               </a:solidFill>
-              <a:latin typeface="Bahnschrift Light"/>
-              <a:cs typeface="Bahnschrift Light"/>
-            </a:endParaRPr>
-          </a:p>
-          <a:p>
-            <a:pPr marL="173990" algn="ctr">
-              <a:lnSpc>
-                <a:spcPct val="100000"/>
-              </a:lnSpc>
-              <a:spcBef>
-                <a:spcPts val="5"/>
-              </a:spcBef>
-            </a:pPr>
-            <a:r>
-              <a:rPr lang="en-US" sz="1600" spc="-10" dirty="0">
-                <a:solidFill>
-                  <a:srgbClr val="001F5F"/>
-                </a:solidFill>
-                <a:latin typeface="Bahnschrift Light"/>
-                <a:cs typeface="Bahnschrift Light"/>
-              </a:rPr>
-              <a:t>ADMIN</a:t>
-            </a:r>
-          </a:p>
-          <a:p>
-            <a:pPr marL="173990" algn="ctr">
-              <a:lnSpc>
-                <a:spcPct val="100000"/>
-              </a:lnSpc>
-              <a:spcBef>
-                <a:spcPts val="5"/>
-              </a:spcBef>
-            </a:pPr>
-            <a:endParaRPr lang="en-US" sz="1600" dirty="0">
-              <a:latin typeface="Bahnschrift Light"/>
-              <a:cs typeface="Bahnschrift Light"/>
-            </a:endParaRPr>
-          </a:p>
-        </p:txBody>
-      </p:sp>
-      <p:cxnSp>
-        <p:nvCxnSpPr>
-          <p:cNvPr id="12" name="Straight Arrow Connector 11">
-            <a:extLst>
-              <a:ext uri="{FF2B5EF4-FFF2-40B4-BE49-F238E27FC236}">
-                <a16:creationId xmlns:a16="http://schemas.microsoft.com/office/drawing/2014/main" id="{ADB2D9B2-1D0C-6E10-6580-652AF8815DB0}"/>
-              </a:ext>
-            </a:extLst>
-          </p:cNvPr>
-          <p:cNvCxnSpPr>
-            <a:stCxn id="8" idx="0"/>
-            <a:endCxn id="6" idx="2"/>
-          </p:cNvCxnSpPr>
-          <p:nvPr/>
-        </p:nvCxnSpPr>
-        <p:spPr>
-          <a:xfrm flipV="1">
-            <a:off x="6083871" y="4567681"/>
-            <a:ext cx="1" cy="719975"/>
-          </a:xfrm>
-          <a:prstGeom prst="straightConnector1">
-            <a:avLst/>
-          </a:prstGeom>
-          <a:ln>
-            <a:solidFill>
-              <a:srgbClr val="002060"/>
-            </a:solidFill>
-            <a:tailEnd type="triangle"/>
-          </a:ln>
-        </p:spPr>
-        <p:style>
-          <a:lnRef idx="1">
-            <a:schemeClr val="accent1"/>
-          </a:lnRef>
-          <a:fillRef idx="0">
-            <a:schemeClr val="accent1"/>
-          </a:fillRef>
-          <a:effectRef idx="0">
-            <a:schemeClr val="accent1"/>
-          </a:effectRef>
-          <a:fontRef idx="minor">
-            <a:schemeClr val="tx1"/>
-          </a:fontRef>
-        </p:style>
-      </p:cxnSp>
+            </a:ln>
+          </p:spPr>
+          <p:txBody>
+            <a:bodyPr vert="horz" wrap="square" lIns="0" tIns="93345" rIns="0" bIns="0" rtlCol="0">
+              <a:spAutoFit/>
+            </a:bodyPr>
+            <a:lstStyle/>
+            <a:p>
+              <a:pPr marL="276225" marR="98425" indent="-170815">
+                <a:lnSpc>
+                  <a:spcPct val="100000"/>
+                </a:lnSpc>
+                <a:spcBef>
+                  <a:spcPts val="735"/>
+                </a:spcBef>
+              </a:pPr>
+              <a:r>
+                <a:rPr lang="en-US" sz="1600" b="0" dirty="0">
+                  <a:solidFill>
+                    <a:srgbClr val="001F5F"/>
+                  </a:solidFill>
+                  <a:latin typeface="Bahnschrift Light"/>
+                  <a:cs typeface="Bahnschrift Light"/>
+                </a:rPr>
+                <a:t>M</a:t>
+              </a:r>
+              <a:r>
+                <a:rPr lang="en-US" sz="1600" b="0" spc="-5" dirty="0">
+                  <a:solidFill>
+                    <a:srgbClr val="001F5F"/>
+                  </a:solidFill>
+                  <a:latin typeface="Bahnschrift Light"/>
+                  <a:cs typeface="Bahnschrift Light"/>
+                </a:rPr>
+                <a:t>i</a:t>
+              </a:r>
+              <a:r>
+                <a:rPr lang="en-US" sz="1600" b="0" dirty="0">
+                  <a:solidFill>
+                    <a:srgbClr val="001F5F"/>
+                  </a:solidFill>
+                  <a:latin typeface="Bahnschrift Light"/>
+                  <a:cs typeface="Bahnschrift Light"/>
+                </a:rPr>
+                <a:t>crof</a:t>
+              </a:r>
+              <a:r>
+                <a:rPr lang="en-US" sz="1600" b="0" spc="-5" dirty="0">
+                  <a:solidFill>
+                    <a:srgbClr val="001F5F"/>
+                  </a:solidFill>
+                  <a:latin typeface="Bahnschrift Light"/>
+                  <a:cs typeface="Bahnschrift Light"/>
+                </a:rPr>
+                <a:t>inan</a:t>
+              </a:r>
+              <a:r>
+                <a:rPr lang="en-US" sz="1600" b="0" dirty="0">
+                  <a:solidFill>
+                    <a:srgbClr val="001F5F"/>
+                  </a:solidFill>
+                  <a:latin typeface="Bahnschrift Light"/>
+                  <a:cs typeface="Bahnschrift Light"/>
+                </a:rPr>
+                <a:t>ce  </a:t>
+              </a:r>
+              <a:r>
+                <a:rPr lang="en-US" sz="1600" b="0" spc="-5" dirty="0">
+                  <a:solidFill>
+                    <a:srgbClr val="001F5F"/>
+                  </a:solidFill>
+                  <a:latin typeface="Bahnschrift Light"/>
+                  <a:cs typeface="Bahnschrift Light"/>
+                </a:rPr>
+                <a:t>Institution ..</a:t>
+              </a:r>
+              <a:endParaRPr lang="en-US" sz="1600" dirty="0">
+                <a:latin typeface="Bahnschrift Light"/>
+                <a:cs typeface="Bahnschrift Light"/>
+              </a:endParaRPr>
+            </a:p>
+          </p:txBody>
+        </p:sp>
+        <p:sp>
+          <p:nvSpPr>
+            <p:cNvPr id="18" name="object 7">
+              <a:extLst>
+                <a:ext uri="{FF2B5EF4-FFF2-40B4-BE49-F238E27FC236}">
+                  <a16:creationId xmlns:a16="http://schemas.microsoft.com/office/drawing/2014/main" id="{12C5A14D-32CF-6079-E6EB-92E54AE9DE05}"/>
+                </a:ext>
+              </a:extLst>
+            </p:cNvPr>
+            <p:cNvSpPr txBox="1"/>
+            <p:nvPr/>
+          </p:nvSpPr>
+          <p:spPr>
+            <a:xfrm>
+              <a:off x="8763000" y="3965143"/>
+              <a:ext cx="2863596" cy="340478"/>
+            </a:xfrm>
+            <a:prstGeom prst="rect">
+              <a:avLst/>
+            </a:prstGeom>
+            <a:ln w="12700">
+              <a:solidFill>
+                <a:srgbClr val="001F5F"/>
+              </a:solidFill>
+            </a:ln>
+          </p:spPr>
+          <p:txBody>
+            <a:bodyPr vert="horz" wrap="square" lIns="0" tIns="93345" rIns="0" bIns="0" rtlCol="0">
+              <a:spAutoFit/>
+            </a:bodyPr>
+            <a:lstStyle/>
+            <a:p>
+              <a:pPr marL="276225" marR="98425" indent="-170815">
+                <a:lnSpc>
+                  <a:spcPct val="100000"/>
+                </a:lnSpc>
+                <a:spcBef>
+                  <a:spcPts val="735"/>
+                </a:spcBef>
+              </a:pPr>
+              <a:r>
+                <a:rPr lang="en-US" sz="1600" b="0" dirty="0">
+                  <a:solidFill>
+                    <a:srgbClr val="001F5F"/>
+                  </a:solidFill>
+                  <a:latin typeface="Bahnschrift Light"/>
+                  <a:cs typeface="Bahnschrift Light"/>
+                </a:rPr>
+                <a:t>M</a:t>
+              </a:r>
+              <a:r>
+                <a:rPr lang="en-US" sz="1600" b="0" spc="-5" dirty="0">
+                  <a:solidFill>
+                    <a:srgbClr val="001F5F"/>
+                  </a:solidFill>
+                  <a:latin typeface="Bahnschrift Light"/>
+                  <a:cs typeface="Bahnschrift Light"/>
+                </a:rPr>
+                <a:t>i</a:t>
+              </a:r>
+              <a:r>
+                <a:rPr lang="en-US" sz="1600" b="0" dirty="0">
+                  <a:solidFill>
+                    <a:srgbClr val="001F5F"/>
+                  </a:solidFill>
+                  <a:latin typeface="Bahnschrift Light"/>
+                  <a:cs typeface="Bahnschrift Light"/>
+                </a:rPr>
+                <a:t>crof</a:t>
+              </a:r>
+              <a:r>
+                <a:rPr lang="en-US" sz="1600" b="0" spc="-5" dirty="0">
+                  <a:solidFill>
+                    <a:srgbClr val="001F5F"/>
+                  </a:solidFill>
+                  <a:latin typeface="Bahnschrift Light"/>
+                  <a:cs typeface="Bahnschrift Light"/>
+                </a:rPr>
+                <a:t>inan</a:t>
+              </a:r>
+              <a:r>
+                <a:rPr lang="en-US" sz="1600" b="0" dirty="0">
+                  <a:solidFill>
+                    <a:srgbClr val="001F5F"/>
+                  </a:solidFill>
+                  <a:latin typeface="Bahnschrift Light"/>
+                  <a:cs typeface="Bahnschrift Light"/>
+                </a:rPr>
+                <a:t>ce  </a:t>
+              </a:r>
+              <a:r>
+                <a:rPr lang="en-US" sz="1600" b="0" spc="-5" dirty="0">
+                  <a:solidFill>
+                    <a:srgbClr val="001F5F"/>
+                  </a:solidFill>
+                  <a:latin typeface="Bahnschrift Light"/>
+                  <a:cs typeface="Bahnschrift Light"/>
+                </a:rPr>
+                <a:t>Institution ..</a:t>
+              </a:r>
+              <a:endParaRPr lang="en-US" sz="1600" dirty="0">
+                <a:latin typeface="Bahnschrift Light"/>
+                <a:cs typeface="Bahnschrift Light"/>
+              </a:endParaRPr>
+            </a:p>
+          </p:txBody>
+        </p:sp>
+        <p:sp>
+          <p:nvSpPr>
+            <p:cNvPr id="19" name="object 7">
+              <a:extLst>
+                <a:ext uri="{FF2B5EF4-FFF2-40B4-BE49-F238E27FC236}">
+                  <a16:creationId xmlns:a16="http://schemas.microsoft.com/office/drawing/2014/main" id="{700ACE08-889B-4E5E-E445-55CCF69C7DB2}"/>
+                </a:ext>
+              </a:extLst>
+            </p:cNvPr>
+            <p:cNvSpPr txBox="1"/>
+            <p:nvPr/>
+          </p:nvSpPr>
+          <p:spPr>
+            <a:xfrm>
+              <a:off x="8763000" y="4559763"/>
+              <a:ext cx="2863596" cy="340478"/>
+            </a:xfrm>
+            <a:prstGeom prst="rect">
+              <a:avLst/>
+            </a:prstGeom>
+            <a:ln w="12700">
+              <a:solidFill>
+                <a:srgbClr val="001F5F"/>
+              </a:solidFill>
+            </a:ln>
+          </p:spPr>
+          <p:txBody>
+            <a:bodyPr vert="horz" wrap="square" lIns="0" tIns="93345" rIns="0" bIns="0" rtlCol="0">
+              <a:spAutoFit/>
+            </a:bodyPr>
+            <a:lstStyle/>
+            <a:p>
+              <a:pPr marL="276225" marR="98425" indent="-170815">
+                <a:lnSpc>
+                  <a:spcPct val="100000"/>
+                </a:lnSpc>
+                <a:spcBef>
+                  <a:spcPts val="735"/>
+                </a:spcBef>
+              </a:pPr>
+              <a:r>
+                <a:rPr lang="en-US" sz="1600" b="0" dirty="0">
+                  <a:solidFill>
+                    <a:srgbClr val="001F5F"/>
+                  </a:solidFill>
+                  <a:latin typeface="Bahnschrift Light"/>
+                  <a:cs typeface="Bahnschrift Light"/>
+                </a:rPr>
+                <a:t>M</a:t>
+              </a:r>
+              <a:r>
+                <a:rPr lang="en-US" sz="1600" b="0" spc="-5" dirty="0">
+                  <a:solidFill>
+                    <a:srgbClr val="001F5F"/>
+                  </a:solidFill>
+                  <a:latin typeface="Bahnschrift Light"/>
+                  <a:cs typeface="Bahnschrift Light"/>
+                </a:rPr>
+                <a:t>i</a:t>
+              </a:r>
+              <a:r>
+                <a:rPr lang="en-US" sz="1600" b="0" dirty="0">
+                  <a:solidFill>
+                    <a:srgbClr val="001F5F"/>
+                  </a:solidFill>
+                  <a:latin typeface="Bahnschrift Light"/>
+                  <a:cs typeface="Bahnschrift Light"/>
+                </a:rPr>
+                <a:t>crof</a:t>
+              </a:r>
+              <a:r>
+                <a:rPr lang="en-US" sz="1600" b="0" spc="-5" dirty="0">
+                  <a:solidFill>
+                    <a:srgbClr val="001F5F"/>
+                  </a:solidFill>
+                  <a:latin typeface="Bahnschrift Light"/>
+                  <a:cs typeface="Bahnschrift Light"/>
+                </a:rPr>
+                <a:t>inan</a:t>
+              </a:r>
+              <a:r>
+                <a:rPr lang="en-US" sz="1600" b="0" dirty="0">
+                  <a:solidFill>
+                    <a:srgbClr val="001F5F"/>
+                  </a:solidFill>
+                  <a:latin typeface="Bahnschrift Light"/>
+                  <a:cs typeface="Bahnschrift Light"/>
+                </a:rPr>
+                <a:t>ce  </a:t>
+              </a:r>
+              <a:r>
+                <a:rPr lang="en-US" sz="1600" b="0" spc="-5" dirty="0">
+                  <a:solidFill>
+                    <a:srgbClr val="001F5F"/>
+                  </a:solidFill>
+                  <a:latin typeface="Bahnschrift Light"/>
+                  <a:cs typeface="Bahnschrift Light"/>
+                </a:rPr>
+                <a:t>Institution ..n</a:t>
+              </a:r>
+              <a:endParaRPr lang="en-US" sz="1600" dirty="0">
+                <a:latin typeface="Bahnschrift Light"/>
+                <a:cs typeface="Bahnschrift Light"/>
+              </a:endParaRPr>
+            </a:p>
+          </p:txBody>
+        </p:sp>
+        <p:cxnSp>
+          <p:nvCxnSpPr>
+            <p:cNvPr id="21" name="Connector: Elbow 20">
+              <a:extLst>
+                <a:ext uri="{FF2B5EF4-FFF2-40B4-BE49-F238E27FC236}">
+                  <a16:creationId xmlns:a16="http://schemas.microsoft.com/office/drawing/2014/main" id="{AA8DA5DD-D0D2-E68C-B3DE-A171B7B25F83}"/>
+                </a:ext>
+              </a:extLst>
+            </p:cNvPr>
+            <p:cNvCxnSpPr>
+              <a:stCxn id="7" idx="1"/>
+              <a:endCxn id="19" idx="1"/>
+            </p:cNvCxnSpPr>
+            <p:nvPr/>
+          </p:nvCxnSpPr>
+          <p:spPr>
+            <a:xfrm rot="10800000" flipV="1">
+              <a:off x="8763000" y="2913438"/>
+              <a:ext cx="12700" cy="1816563"/>
+            </a:xfrm>
+            <a:prstGeom prst="bentConnector3">
+              <a:avLst>
+                <a:gd name="adj1" fmla="val 1800000"/>
+              </a:avLst>
+            </a:prstGeom>
+            <a:ln>
+              <a:solidFill>
+                <a:srgbClr val="002060"/>
+              </a:solidFill>
+            </a:ln>
+          </p:spPr>
+          <p:style>
+            <a:lnRef idx="1">
+              <a:schemeClr val="accent1"/>
+            </a:lnRef>
+            <a:fillRef idx="0">
+              <a:schemeClr val="accent1"/>
+            </a:fillRef>
+            <a:effectRef idx="0">
+              <a:schemeClr val="accent1"/>
+            </a:effectRef>
+            <a:fontRef idx="minor">
+              <a:schemeClr val="tx1"/>
+            </a:fontRef>
+          </p:style>
+        </p:cxnSp>
+        <p:cxnSp>
+          <p:nvCxnSpPr>
+            <p:cNvPr id="27" name="Straight Arrow Connector 26">
+              <a:extLst>
+                <a:ext uri="{FF2B5EF4-FFF2-40B4-BE49-F238E27FC236}">
+                  <a16:creationId xmlns:a16="http://schemas.microsoft.com/office/drawing/2014/main" id="{94B9E28E-B302-E2EB-4DE5-AAAC71F4B68B}"/>
+                </a:ext>
+              </a:extLst>
+            </p:cNvPr>
+            <p:cNvCxnSpPr>
+              <a:cxnSpLocks/>
+            </p:cNvCxnSpPr>
+            <p:nvPr/>
+          </p:nvCxnSpPr>
+          <p:spPr>
+            <a:xfrm flipH="1">
+              <a:off x="7586599" y="3624994"/>
+              <a:ext cx="968724" cy="0"/>
+            </a:xfrm>
+            <a:prstGeom prst="straightConnector1">
+              <a:avLst/>
+            </a:prstGeom>
+            <a:ln>
+              <a:solidFill>
+                <a:srgbClr val="002060"/>
+              </a:solidFill>
+              <a:tailEnd type="triangle"/>
+            </a:ln>
+          </p:spPr>
+          <p:style>
+            <a:lnRef idx="1">
+              <a:schemeClr val="accent1"/>
+            </a:lnRef>
+            <a:fillRef idx="0">
+              <a:schemeClr val="accent1"/>
+            </a:fillRef>
+            <a:effectRef idx="0">
+              <a:schemeClr val="accent1"/>
+            </a:effectRef>
+            <a:fontRef idx="minor">
+              <a:schemeClr val="tx1"/>
+            </a:fontRef>
+          </p:style>
+        </p:cxnSp>
+        <p:cxnSp>
+          <p:nvCxnSpPr>
+            <p:cNvPr id="32" name="Straight Connector 31">
+              <a:extLst>
+                <a:ext uri="{FF2B5EF4-FFF2-40B4-BE49-F238E27FC236}">
+                  <a16:creationId xmlns:a16="http://schemas.microsoft.com/office/drawing/2014/main" id="{5D20EFF9-14CC-13A9-93A0-0D364C8AA6F7}"/>
+                </a:ext>
+              </a:extLst>
+            </p:cNvPr>
+            <p:cNvCxnSpPr>
+              <a:cxnSpLocks/>
+              <a:stCxn id="17" idx="1"/>
+            </p:cNvCxnSpPr>
+            <p:nvPr/>
+          </p:nvCxnSpPr>
+          <p:spPr>
+            <a:xfrm flipH="1">
+              <a:off x="8555323" y="3540762"/>
+              <a:ext cx="207677" cy="0"/>
+            </a:xfrm>
+            <a:prstGeom prst="line">
+              <a:avLst/>
+            </a:prstGeom>
+            <a:ln>
+              <a:solidFill>
+                <a:srgbClr val="002060"/>
+              </a:solidFill>
+            </a:ln>
+          </p:spPr>
+          <p:style>
+            <a:lnRef idx="1">
+              <a:schemeClr val="accent1"/>
+            </a:lnRef>
+            <a:fillRef idx="0">
+              <a:schemeClr val="accent1"/>
+            </a:fillRef>
+            <a:effectRef idx="0">
+              <a:schemeClr val="accent1"/>
+            </a:effectRef>
+            <a:fontRef idx="minor">
+              <a:schemeClr val="tx1"/>
+            </a:fontRef>
+          </p:style>
+        </p:cxnSp>
+        <p:cxnSp>
+          <p:nvCxnSpPr>
+            <p:cNvPr id="34" name="Straight Connector 33">
+              <a:extLst>
+                <a:ext uri="{FF2B5EF4-FFF2-40B4-BE49-F238E27FC236}">
+                  <a16:creationId xmlns:a16="http://schemas.microsoft.com/office/drawing/2014/main" id="{5C948921-0CFF-6FB7-254B-10DFD24BCFC8}"/>
+                </a:ext>
+              </a:extLst>
+            </p:cNvPr>
+            <p:cNvCxnSpPr>
+              <a:cxnSpLocks/>
+              <a:stCxn id="18" idx="1"/>
+            </p:cNvCxnSpPr>
+            <p:nvPr/>
+          </p:nvCxnSpPr>
+          <p:spPr>
+            <a:xfrm flipH="1">
+              <a:off x="8555323" y="4135382"/>
+              <a:ext cx="207677" cy="0"/>
+            </a:xfrm>
+            <a:prstGeom prst="line">
+              <a:avLst/>
+            </a:prstGeom>
+            <a:ln>
+              <a:solidFill>
+                <a:srgbClr val="002060"/>
+              </a:solidFill>
+            </a:ln>
+          </p:spPr>
+          <p:style>
+            <a:lnRef idx="1">
+              <a:schemeClr val="accent1"/>
+            </a:lnRef>
+            <a:fillRef idx="0">
+              <a:schemeClr val="accent1"/>
+            </a:fillRef>
+            <a:effectRef idx="0">
+              <a:schemeClr val="accent1"/>
+            </a:effectRef>
+            <a:fontRef idx="minor">
+              <a:schemeClr val="tx1"/>
+            </a:fontRef>
+          </p:style>
+        </p:cxnSp>
+        <p:cxnSp>
+          <p:nvCxnSpPr>
+            <p:cNvPr id="37" name="Straight Arrow Connector 36">
+              <a:extLst>
+                <a:ext uri="{FF2B5EF4-FFF2-40B4-BE49-F238E27FC236}">
+                  <a16:creationId xmlns:a16="http://schemas.microsoft.com/office/drawing/2014/main" id="{57E87BB6-2738-788D-A881-D1E023E35EA3}"/>
+                </a:ext>
+              </a:extLst>
+            </p:cNvPr>
+            <p:cNvCxnSpPr>
+              <a:cxnSpLocks/>
+            </p:cNvCxnSpPr>
+            <p:nvPr/>
+          </p:nvCxnSpPr>
+          <p:spPr>
+            <a:xfrm>
+              <a:off x="7586599" y="3962400"/>
+              <a:ext cx="968724" cy="0"/>
+            </a:xfrm>
+            <a:prstGeom prst="straightConnector1">
+              <a:avLst/>
+            </a:prstGeom>
+            <a:ln>
+              <a:solidFill>
+                <a:srgbClr val="002060"/>
+              </a:solidFill>
+              <a:tailEnd type="triangle"/>
+            </a:ln>
+          </p:spPr>
+          <p:style>
+            <a:lnRef idx="1">
+              <a:schemeClr val="accent1"/>
+            </a:lnRef>
+            <a:fillRef idx="0">
+              <a:schemeClr val="accent1"/>
+            </a:fillRef>
+            <a:effectRef idx="0">
+              <a:schemeClr val="accent1"/>
+            </a:effectRef>
+            <a:fontRef idx="minor">
+              <a:schemeClr val="tx1"/>
+            </a:fontRef>
+          </p:style>
+        </p:cxnSp>
+        <p:sp>
+          <p:nvSpPr>
+            <p:cNvPr id="8" name="object 4">
+              <a:extLst>
+                <a:ext uri="{FF2B5EF4-FFF2-40B4-BE49-F238E27FC236}">
+                  <a16:creationId xmlns:a16="http://schemas.microsoft.com/office/drawing/2014/main" id="{E33D91DB-63D6-A074-A349-ADEDFEF258CE}"/>
+                </a:ext>
+              </a:extLst>
+            </p:cNvPr>
+            <p:cNvSpPr txBox="1"/>
+            <p:nvPr/>
+          </p:nvSpPr>
+          <p:spPr>
+            <a:xfrm>
+              <a:off x="5169471" y="5287656"/>
+              <a:ext cx="1828800" cy="744435"/>
+            </a:xfrm>
+            <a:prstGeom prst="rect">
+              <a:avLst/>
+            </a:prstGeom>
+            <a:ln w="12700">
+              <a:solidFill>
+                <a:srgbClr val="001F5F"/>
+              </a:solidFill>
+            </a:ln>
+          </p:spPr>
+          <p:txBody>
+            <a:bodyPr vert="horz" wrap="square" lIns="0" tIns="5715" rIns="0" bIns="0" rtlCol="0">
+              <a:spAutoFit/>
+            </a:bodyPr>
+            <a:lstStyle/>
+            <a:p>
+              <a:pPr marL="173990" algn="ctr">
+                <a:lnSpc>
+                  <a:spcPct val="100000"/>
+                </a:lnSpc>
+                <a:spcBef>
+                  <a:spcPts val="5"/>
+                </a:spcBef>
+              </a:pPr>
+              <a:endParaRPr lang="en-US" sz="1600" spc="-10" dirty="0">
+                <a:solidFill>
+                  <a:srgbClr val="001F5F"/>
+                </a:solidFill>
+                <a:latin typeface="Bahnschrift Light"/>
+                <a:cs typeface="Bahnschrift Light"/>
+              </a:endParaRPr>
+            </a:p>
+            <a:p>
+              <a:pPr marL="173990" algn="ctr">
+                <a:lnSpc>
+                  <a:spcPct val="100000"/>
+                </a:lnSpc>
+                <a:spcBef>
+                  <a:spcPts val="5"/>
+                </a:spcBef>
+              </a:pPr>
+              <a:r>
+                <a:rPr lang="en-US" sz="1600" spc="-10" dirty="0">
+                  <a:solidFill>
+                    <a:srgbClr val="001F5F"/>
+                  </a:solidFill>
+                  <a:latin typeface="Bahnschrift Light"/>
+                  <a:cs typeface="Bahnschrift Light"/>
+                </a:rPr>
+                <a:t>ADMIN</a:t>
+              </a:r>
+            </a:p>
+            <a:p>
+              <a:pPr marL="173990" algn="ctr">
+                <a:lnSpc>
+                  <a:spcPct val="100000"/>
+                </a:lnSpc>
+                <a:spcBef>
+                  <a:spcPts val="5"/>
+                </a:spcBef>
+              </a:pPr>
+              <a:endParaRPr lang="en-US" sz="1600" dirty="0">
+                <a:latin typeface="Bahnschrift Light"/>
+                <a:cs typeface="Bahnschrift Light"/>
+              </a:endParaRPr>
+            </a:p>
+          </p:txBody>
+        </p:sp>
+        <p:cxnSp>
+          <p:nvCxnSpPr>
+            <p:cNvPr id="12" name="Straight Arrow Connector 11">
+              <a:extLst>
+                <a:ext uri="{FF2B5EF4-FFF2-40B4-BE49-F238E27FC236}">
+                  <a16:creationId xmlns:a16="http://schemas.microsoft.com/office/drawing/2014/main" id="{ADB2D9B2-1D0C-6E10-6580-652AF8815DB0}"/>
+                </a:ext>
+              </a:extLst>
+            </p:cNvPr>
+            <p:cNvCxnSpPr>
+              <a:stCxn id="8" idx="0"/>
+              <a:endCxn id="6" idx="2"/>
+            </p:cNvCxnSpPr>
+            <p:nvPr/>
+          </p:nvCxnSpPr>
+          <p:spPr>
+            <a:xfrm flipV="1">
+              <a:off x="6083871" y="4567681"/>
+              <a:ext cx="1" cy="719975"/>
+            </a:xfrm>
+            <a:prstGeom prst="straightConnector1">
+              <a:avLst/>
+            </a:prstGeom>
+            <a:ln>
+              <a:solidFill>
+                <a:srgbClr val="002060"/>
+              </a:solidFill>
+              <a:tailEnd type="triangle"/>
+            </a:ln>
+          </p:spPr>
+          <p:style>
+            <a:lnRef idx="1">
+              <a:schemeClr val="accent1"/>
+            </a:lnRef>
+            <a:fillRef idx="0">
+              <a:schemeClr val="accent1"/>
+            </a:fillRef>
+            <a:effectRef idx="0">
+              <a:schemeClr val="accent1"/>
+            </a:effectRef>
+            <a:fontRef idx="minor">
+              <a:schemeClr val="tx1"/>
+            </a:fontRef>
+          </p:style>
+        </p:cxnSp>
+      </p:grpSp>
     </p:spTree>
   </p:cSld>
   <p:clrMapOvr>

</xml_diff>